<commit_message>
rough draft of slides finished. On to code demos and slide refining.
</commit_message>
<xml_diff>
--- a/That Conference 2014/Building PhoneGap Mobile App w KendoUI.pptx
+++ b/That Conference 2014/Building PhoneGap Mobile App w KendoUI.pptx
@@ -5,7 +5,7 @@
     <p:sldMasterId id="2147483660" r:id="rId1"/>
   </p:sldMasterIdLst>
   <p:notesMasterIdLst>
-    <p:notesMasterId r:id="rId25"/>
+    <p:notesMasterId r:id="rId31"/>
   </p:notesMasterIdLst>
   <p:sldIdLst>
     <p:sldId id="256" r:id="rId2"/>
@@ -24,13 +24,19 @@
     <p:sldId id="279" r:id="rId15"/>
     <p:sldId id="278" r:id="rId16"/>
     <p:sldId id="280" r:id="rId17"/>
-    <p:sldId id="265" r:id="rId18"/>
-    <p:sldId id="266" r:id="rId19"/>
-    <p:sldId id="273" r:id="rId20"/>
-    <p:sldId id="261" r:id="rId21"/>
-    <p:sldId id="262" r:id="rId22"/>
-    <p:sldId id="263" r:id="rId23"/>
-    <p:sldId id="264" r:id="rId24"/>
+    <p:sldId id="266" r:id="rId18"/>
+    <p:sldId id="265" r:id="rId19"/>
+    <p:sldId id="282" r:id="rId20"/>
+    <p:sldId id="285" r:id="rId21"/>
+    <p:sldId id="284" r:id="rId22"/>
+    <p:sldId id="283" r:id="rId23"/>
+    <p:sldId id="273" r:id="rId24"/>
+    <p:sldId id="262" r:id="rId25"/>
+    <p:sldId id="261" r:id="rId26"/>
+    <p:sldId id="281" r:id="rId27"/>
+    <p:sldId id="286" r:id="rId28"/>
+    <p:sldId id="263" r:id="rId29"/>
+    <p:sldId id="264" r:id="rId30"/>
   </p:sldIdLst>
   <p:sldSz cx="9144000" cy="6858000" type="screen4x3"/>
   <p:notesSz cx="6858000" cy="9144000"/>
@@ -214,7 +220,7 @@
           <a:p>
             <a:fld id="{EC2BCC37-2920-4C1D-8057-51EE69B1718A}" type="datetimeFigureOut">
               <a:rPr lang="en-US" smtClean="0"/>
-              <a:t>7/12/2014</a:t>
+              <a:t>7/13/2014</a:t>
             </a:fld>
             <a:endParaRPr lang="en-US"/>
           </a:p>
@@ -566,6 +572,378 @@
 </p:notes>
 </file>
 
+<file path=ppt/notesSlides/notesSlide10.xml><?xml version="1.0" encoding="utf-8"?>
+<p:notes xmlns:a="http://schemas.openxmlformats.org/drawingml/2006/main" xmlns:r="http://schemas.openxmlformats.org/officeDocument/2006/relationships" xmlns:p="http://schemas.openxmlformats.org/presentationml/2006/main">
+  <p:cSld>
+    <p:spTree>
+      <p:nvGrpSpPr>
+        <p:cNvPr id="1" name=""/>
+        <p:cNvGrpSpPr/>
+        <p:nvPr/>
+      </p:nvGrpSpPr>
+      <p:grpSpPr>
+        <a:xfrm>
+          <a:off x="0" y="0"/>
+          <a:ext cx="0" cy="0"/>
+          <a:chOff x="0" y="0"/>
+          <a:chExt cx="0" cy="0"/>
+        </a:xfrm>
+      </p:grpSpPr>
+      <p:sp>
+        <p:nvSpPr>
+          <p:cNvPr id="2" name="Slide Image Placeholder 1"/>
+          <p:cNvSpPr>
+            <a:spLocks noGrp="1" noRot="1" noChangeAspect="1"/>
+          </p:cNvSpPr>
+          <p:nvPr>
+            <p:ph type="sldImg"/>
+          </p:nvPr>
+        </p:nvSpPr>
+        <p:spPr/>
+      </p:sp>
+      <p:sp>
+        <p:nvSpPr>
+          <p:cNvPr id="3" name="Notes Placeholder 2"/>
+          <p:cNvSpPr>
+            <a:spLocks noGrp="1"/>
+          </p:cNvSpPr>
+          <p:nvPr>
+            <p:ph type="body" idx="1"/>
+          </p:nvPr>
+        </p:nvSpPr>
+        <p:spPr/>
+        <p:txBody>
+          <a:bodyPr/>
+          <a:lstStyle/>
+          <a:p>
+            <a:r>
+              <a:rPr lang="en-US" dirty="0" smtClean="0"/>
+              <a:t>How do</a:t>
+            </a:r>
+            <a:r>
+              <a:rPr lang="en-US" baseline="0" dirty="0" smtClean="0"/>
+              <a:t> we transform our web app into a native one?  TODO red boxes around native parts</a:t>
+            </a:r>
+            <a:endParaRPr lang="en-US" dirty="0"/>
+          </a:p>
+        </p:txBody>
+      </p:sp>
+      <p:sp>
+        <p:nvSpPr>
+          <p:cNvPr id="4" name="Slide Number Placeholder 3"/>
+          <p:cNvSpPr>
+            <a:spLocks noGrp="1"/>
+          </p:cNvSpPr>
+          <p:nvPr>
+            <p:ph type="sldNum" sz="quarter" idx="10"/>
+          </p:nvPr>
+        </p:nvSpPr>
+        <p:spPr/>
+        <p:txBody>
+          <a:bodyPr/>
+          <a:lstStyle/>
+          <a:p>
+            <a:fld id="{8E70A4CB-D5A4-4016-9063-EAE2719754C8}" type="slidenum">
+              <a:rPr lang="en-US" smtClean="0"/>
+              <a:t>22</a:t>
+            </a:fld>
+            <a:endParaRPr lang="en-US"/>
+          </a:p>
+        </p:txBody>
+      </p:sp>
+    </p:spTree>
+    <p:extLst>
+      <p:ext uri="{BB962C8B-B14F-4D97-AF65-F5344CB8AC3E}">
+        <p14:creationId xmlns:p14="http://schemas.microsoft.com/office/powerpoint/2010/main" val="2771626486"/>
+      </p:ext>
+    </p:extLst>
+  </p:cSld>
+  <p:clrMapOvr>
+    <a:masterClrMapping/>
+  </p:clrMapOvr>
+</p:notes>
+</file>
+
+<file path=ppt/notesSlides/notesSlide11.xml><?xml version="1.0" encoding="utf-8"?>
+<p:notes xmlns:a="http://schemas.openxmlformats.org/drawingml/2006/main" xmlns:r="http://schemas.openxmlformats.org/officeDocument/2006/relationships" xmlns:p="http://schemas.openxmlformats.org/presentationml/2006/main">
+  <p:cSld>
+    <p:spTree>
+      <p:nvGrpSpPr>
+        <p:cNvPr id="1" name=""/>
+        <p:cNvGrpSpPr/>
+        <p:nvPr/>
+      </p:nvGrpSpPr>
+      <p:grpSpPr>
+        <a:xfrm>
+          <a:off x="0" y="0"/>
+          <a:ext cx="0" cy="0"/>
+          <a:chOff x="0" y="0"/>
+          <a:chExt cx="0" cy="0"/>
+        </a:xfrm>
+      </p:grpSpPr>
+      <p:sp>
+        <p:nvSpPr>
+          <p:cNvPr id="2" name="Slide Image Placeholder 1"/>
+          <p:cNvSpPr>
+            <a:spLocks noGrp="1" noRot="1" noChangeAspect="1"/>
+          </p:cNvSpPr>
+          <p:nvPr>
+            <p:ph type="sldImg"/>
+          </p:nvPr>
+        </p:nvSpPr>
+        <p:spPr/>
+      </p:sp>
+      <p:sp>
+        <p:nvSpPr>
+          <p:cNvPr id="3" name="Notes Placeholder 2"/>
+          <p:cNvSpPr>
+            <a:spLocks noGrp="1"/>
+          </p:cNvSpPr>
+          <p:nvPr>
+            <p:ph type="body" idx="1"/>
+          </p:nvPr>
+        </p:nvSpPr>
+        <p:spPr/>
+        <p:txBody>
+          <a:bodyPr/>
+          <a:lstStyle/>
+          <a:p>
+            <a:endParaRPr lang="en-US" dirty="0"/>
+          </a:p>
+        </p:txBody>
+      </p:sp>
+      <p:sp>
+        <p:nvSpPr>
+          <p:cNvPr id="4" name="Slide Number Placeholder 3"/>
+          <p:cNvSpPr>
+            <a:spLocks noGrp="1"/>
+          </p:cNvSpPr>
+          <p:nvPr>
+            <p:ph type="sldNum" sz="quarter" idx="10"/>
+          </p:nvPr>
+        </p:nvSpPr>
+        <p:spPr/>
+        <p:txBody>
+          <a:bodyPr/>
+          <a:lstStyle/>
+          <a:p>
+            <a:fld id="{8E70A4CB-D5A4-4016-9063-EAE2719754C8}" type="slidenum">
+              <a:rPr lang="en-US" smtClean="0"/>
+              <a:t>23</a:t>
+            </a:fld>
+            <a:endParaRPr lang="en-US"/>
+          </a:p>
+        </p:txBody>
+      </p:sp>
+    </p:spTree>
+    <p:extLst>
+      <p:ext uri="{BB962C8B-B14F-4D97-AF65-F5344CB8AC3E}">
+        <p14:creationId xmlns:p14="http://schemas.microsoft.com/office/powerpoint/2010/main" val="1612502210"/>
+      </p:ext>
+    </p:extLst>
+  </p:cSld>
+  <p:clrMapOvr>
+    <a:masterClrMapping/>
+  </p:clrMapOvr>
+</p:notes>
+</file>
+
+<file path=ppt/notesSlides/notesSlide12.xml><?xml version="1.0" encoding="utf-8"?>
+<p:notes xmlns:a="http://schemas.openxmlformats.org/drawingml/2006/main" xmlns:r="http://schemas.openxmlformats.org/officeDocument/2006/relationships" xmlns:p="http://schemas.openxmlformats.org/presentationml/2006/main">
+  <p:cSld>
+    <p:spTree>
+      <p:nvGrpSpPr>
+        <p:cNvPr id="1" name=""/>
+        <p:cNvGrpSpPr/>
+        <p:nvPr/>
+      </p:nvGrpSpPr>
+      <p:grpSpPr>
+        <a:xfrm>
+          <a:off x="0" y="0"/>
+          <a:ext cx="0" cy="0"/>
+          <a:chOff x="0" y="0"/>
+          <a:chExt cx="0" cy="0"/>
+        </a:xfrm>
+      </p:grpSpPr>
+      <p:sp>
+        <p:nvSpPr>
+          <p:cNvPr id="2" name="Slide Image Placeholder 1"/>
+          <p:cNvSpPr>
+            <a:spLocks noGrp="1" noRot="1" noChangeAspect="1"/>
+          </p:cNvSpPr>
+          <p:nvPr>
+            <p:ph type="sldImg"/>
+          </p:nvPr>
+        </p:nvSpPr>
+        <p:spPr/>
+      </p:sp>
+      <p:sp>
+        <p:nvSpPr>
+          <p:cNvPr id="3" name="Notes Placeholder 2"/>
+          <p:cNvSpPr>
+            <a:spLocks noGrp="1"/>
+          </p:cNvSpPr>
+          <p:nvPr>
+            <p:ph type="body" idx="1"/>
+          </p:nvPr>
+        </p:nvSpPr>
+        <p:spPr/>
+        <p:txBody>
+          <a:bodyPr/>
+          <a:lstStyle/>
+          <a:p>
+            <a:r>
+              <a:rPr lang="en-US" dirty="0" smtClean="0"/>
+              <a:t>TODO: prep</a:t>
+            </a:r>
+            <a:r>
+              <a:rPr lang="en-US" baseline="0" dirty="0" smtClean="0"/>
+              <a:t> other slides like this in case of No Internet</a:t>
+            </a:r>
+            <a:endParaRPr lang="en-US" dirty="0"/>
+          </a:p>
+        </p:txBody>
+      </p:sp>
+      <p:sp>
+        <p:nvSpPr>
+          <p:cNvPr id="4" name="Slide Number Placeholder 3"/>
+          <p:cNvSpPr>
+            <a:spLocks noGrp="1"/>
+          </p:cNvSpPr>
+          <p:nvPr>
+            <p:ph type="sldNum" sz="quarter" idx="10"/>
+          </p:nvPr>
+        </p:nvSpPr>
+        <p:spPr/>
+        <p:txBody>
+          <a:bodyPr/>
+          <a:lstStyle/>
+          <a:p>
+            <a:fld id="{8E70A4CB-D5A4-4016-9063-EAE2719754C8}" type="slidenum">
+              <a:rPr lang="en-US" smtClean="0"/>
+              <a:t>25</a:t>
+            </a:fld>
+            <a:endParaRPr lang="en-US"/>
+          </a:p>
+        </p:txBody>
+      </p:sp>
+    </p:spTree>
+    <p:extLst>
+      <p:ext uri="{BB962C8B-B14F-4D97-AF65-F5344CB8AC3E}">
+        <p14:creationId xmlns:p14="http://schemas.microsoft.com/office/powerpoint/2010/main" val="1727237859"/>
+      </p:ext>
+    </p:extLst>
+  </p:cSld>
+  <p:clrMapOvr>
+    <a:masterClrMapping/>
+  </p:clrMapOvr>
+</p:notes>
+</file>
+
+<file path=ppt/notesSlides/notesSlide13.xml><?xml version="1.0" encoding="utf-8"?>
+<p:notes xmlns:a="http://schemas.openxmlformats.org/drawingml/2006/main" xmlns:r="http://schemas.openxmlformats.org/officeDocument/2006/relationships" xmlns:p="http://schemas.openxmlformats.org/presentationml/2006/main">
+  <p:cSld>
+    <p:spTree>
+      <p:nvGrpSpPr>
+        <p:cNvPr id="1" name=""/>
+        <p:cNvGrpSpPr/>
+        <p:nvPr/>
+      </p:nvGrpSpPr>
+      <p:grpSpPr>
+        <a:xfrm>
+          <a:off x="0" y="0"/>
+          <a:ext cx="0" cy="0"/>
+          <a:chOff x="0" y="0"/>
+          <a:chExt cx="0" cy="0"/>
+        </a:xfrm>
+      </p:grpSpPr>
+      <p:sp>
+        <p:nvSpPr>
+          <p:cNvPr id="2" name="Slide Image Placeholder 1"/>
+          <p:cNvSpPr>
+            <a:spLocks noGrp="1" noRot="1" noChangeAspect="1"/>
+          </p:cNvSpPr>
+          <p:nvPr>
+            <p:ph type="sldImg"/>
+          </p:nvPr>
+        </p:nvSpPr>
+        <p:spPr/>
+      </p:sp>
+      <p:sp>
+        <p:nvSpPr>
+          <p:cNvPr id="3" name="Notes Placeholder 2"/>
+          <p:cNvSpPr>
+            <a:spLocks noGrp="1"/>
+          </p:cNvSpPr>
+          <p:nvPr>
+            <p:ph type="body" idx="1"/>
+          </p:nvPr>
+        </p:nvSpPr>
+        <p:spPr/>
+        <p:txBody>
+          <a:bodyPr/>
+          <a:lstStyle/>
+          <a:p>
+            <a:r>
+              <a:rPr lang="en-US" dirty="0" smtClean="0"/>
+              <a:t>Using </a:t>
+            </a:r>
+            <a:r>
+              <a:rPr lang="en-US" dirty="0" err="1" smtClean="0"/>
+              <a:t>KendoUI</a:t>
+            </a:r>
+            <a:r>
+              <a:rPr lang="en-US" dirty="0" smtClean="0"/>
+              <a:t> Mobile, PG Build and </a:t>
+            </a:r>
+            <a:r>
+              <a:rPr lang="en-US" dirty="0" err="1" smtClean="0"/>
+              <a:t>PhoneGap</a:t>
+            </a:r>
+            <a:r>
+              <a:rPr lang="en-US" baseline="0" dirty="0" smtClean="0"/>
+              <a:t> we cover all the parts of a hybrid app!</a:t>
+            </a:r>
+            <a:endParaRPr lang="en-US" dirty="0"/>
+          </a:p>
+        </p:txBody>
+      </p:sp>
+      <p:sp>
+        <p:nvSpPr>
+          <p:cNvPr id="4" name="Slide Number Placeholder 3"/>
+          <p:cNvSpPr>
+            <a:spLocks noGrp="1"/>
+          </p:cNvSpPr>
+          <p:nvPr>
+            <p:ph type="sldNum" sz="quarter" idx="10"/>
+          </p:nvPr>
+        </p:nvSpPr>
+        <p:spPr/>
+        <p:txBody>
+          <a:bodyPr/>
+          <a:lstStyle/>
+          <a:p>
+            <a:fld id="{8E70A4CB-D5A4-4016-9063-EAE2719754C8}" type="slidenum">
+              <a:rPr lang="en-US" smtClean="0"/>
+              <a:t>26</a:t>
+            </a:fld>
+            <a:endParaRPr lang="en-US"/>
+          </a:p>
+        </p:txBody>
+      </p:sp>
+    </p:spTree>
+    <p:extLst>
+      <p:ext uri="{BB962C8B-B14F-4D97-AF65-F5344CB8AC3E}">
+        <p14:creationId xmlns:p14="http://schemas.microsoft.com/office/powerpoint/2010/main" val="4002310454"/>
+      </p:ext>
+    </p:extLst>
+  </p:cSld>
+  <p:clrMapOvr>
+    <a:masterClrMapping/>
+  </p:clrMapOvr>
+</p:notes>
+</file>
+
 <file path=ppt/notesSlides/notesSlide2.xml><?xml version="1.0" encoding="utf-8"?>
 <p:notes xmlns:a="http://schemas.openxmlformats.org/drawingml/2006/main" xmlns:r="http://schemas.openxmlformats.org/officeDocument/2006/relationships" xmlns:p="http://schemas.openxmlformats.org/presentationml/2006/main">
   <p:cSld>
@@ -1267,12 +1645,24 @@
           <a:lstStyle/>
           <a:p>
             <a:r>
+              <a:rPr lang="en-US" dirty="0" err="1" smtClean="0"/>
+              <a:t>KendoUI</a:t>
+            </a:r>
+            <a:r>
               <a:rPr lang="en-US" dirty="0" smtClean="0"/>
-              <a:t>Arrows pointing to each:</a:t>
+              <a:t> Mobile is part of the</a:t>
             </a:r>
             <a:r>
               <a:rPr lang="en-US" baseline="0" dirty="0" smtClean="0"/>
-              <a:t> up until now we’ve demonstrated Web version only…. Let’s use Build to create an actual hybrid app.</a:t>
+              <a:t> larger </a:t>
+            </a:r>
+            <a:r>
+              <a:rPr lang="en-US" baseline="0" dirty="0" err="1" smtClean="0"/>
+              <a:t>KendoUI</a:t>
+            </a:r>
+            <a:r>
+              <a:rPr lang="en-US" baseline="0" dirty="0" smtClean="0"/>
+              <a:t> framework suite</a:t>
             </a:r>
             <a:endParaRPr lang="en-US" dirty="0"/>
           </a:p>
@@ -1295,7 +1685,7 @@
           <a:p>
             <a:fld id="{8E70A4CB-D5A4-4016-9063-EAE2719754C8}" type="slidenum">
               <a:rPr lang="en-US" smtClean="0"/>
-              <a:t>19</a:t>
+              <a:t>18</a:t>
             </a:fld>
             <a:endParaRPr lang="en-US"/>
           </a:p>
@@ -1304,7 +1694,7 @@
     </p:spTree>
     <p:extLst>
       <p:ext uri="{BB962C8B-B14F-4D97-AF65-F5344CB8AC3E}">
-        <p14:creationId xmlns:p14="http://schemas.microsoft.com/office/powerpoint/2010/main" val="1612502210"/>
+        <p14:creationId xmlns:p14="http://schemas.microsoft.com/office/powerpoint/2010/main" val="3755059056"/>
       </p:ext>
     </p:extLst>
   </p:cSld>
@@ -1511,7 +1901,7 @@
           <a:p>
             <a:fld id="{34ED9B13-E5A7-4F15-9144-85834FFDF6F3}" type="datetimeFigureOut">
               <a:rPr lang="en-US" smtClean="0"/>
-              <a:t>7/12/2014</a:t>
+              <a:t>7/13/2014</a:t>
             </a:fld>
             <a:endParaRPr lang="en-US"/>
           </a:p>
@@ -1696,7 +2086,7 @@
           <a:p>
             <a:fld id="{34ED9B13-E5A7-4F15-9144-85834FFDF6F3}" type="datetimeFigureOut">
               <a:rPr lang="en-US" smtClean="0"/>
-              <a:t>7/12/2014</a:t>
+              <a:t>7/13/2014</a:t>
             </a:fld>
             <a:endParaRPr lang="en-US"/>
           </a:p>
@@ -1902,7 +2292,7 @@
           <a:p>
             <a:fld id="{34ED9B13-E5A7-4F15-9144-85834FFDF6F3}" type="datetimeFigureOut">
               <a:rPr lang="en-US" smtClean="0"/>
-              <a:t>7/12/2014</a:t>
+              <a:t>7/13/2014</a:t>
             </a:fld>
             <a:endParaRPr lang="en-US"/>
           </a:p>
@@ -2071,7 +2461,7 @@
           <a:p>
             <a:fld id="{34ED9B13-E5A7-4F15-9144-85834FFDF6F3}" type="datetimeFigureOut">
               <a:rPr lang="en-US" smtClean="0"/>
-              <a:t>7/12/2014</a:t>
+              <a:t>7/13/2014</a:t>
             </a:fld>
             <a:endParaRPr lang="en-US"/>
           </a:p>
@@ -2358,7 +2748,7 @@
           <a:p>
             <a:fld id="{34ED9B13-E5A7-4F15-9144-85834FFDF6F3}" type="datetimeFigureOut">
               <a:rPr lang="en-US" smtClean="0"/>
-              <a:t>7/12/2014</a:t>
+              <a:t>7/13/2014</a:t>
             </a:fld>
             <a:endParaRPr lang="en-US"/>
           </a:p>
@@ -2665,7 +3055,7 @@
           <a:p>
             <a:fld id="{34ED9B13-E5A7-4F15-9144-85834FFDF6F3}" type="datetimeFigureOut">
               <a:rPr lang="en-US" smtClean="0"/>
-              <a:t>7/12/2014</a:t>
+              <a:t>7/13/2014</a:t>
             </a:fld>
             <a:endParaRPr lang="en-US"/>
           </a:p>
@@ -3115,7 +3505,7 @@
           <a:p>
             <a:fld id="{34ED9B13-E5A7-4F15-9144-85834FFDF6F3}" type="datetimeFigureOut">
               <a:rPr lang="en-US" smtClean="0"/>
-              <a:t>7/12/2014</a:t>
+              <a:t>7/13/2014</a:t>
             </a:fld>
             <a:endParaRPr lang="en-US"/>
           </a:p>
@@ -3225,7 +3615,7 @@
           <a:p>
             <a:fld id="{34ED9B13-E5A7-4F15-9144-85834FFDF6F3}" type="datetimeFigureOut">
               <a:rPr lang="en-US" smtClean="0"/>
-              <a:t>7/12/2014</a:t>
+              <a:t>7/13/2014</a:t>
             </a:fld>
             <a:endParaRPr lang="en-US"/>
           </a:p>
@@ -3353,7 +3743,7 @@
           <a:p>
             <a:fld id="{34ED9B13-E5A7-4F15-9144-85834FFDF6F3}" type="datetimeFigureOut">
               <a:rPr lang="en-US" smtClean="0"/>
-              <a:t>7/12/2014</a:t>
+              <a:t>7/13/2014</a:t>
             </a:fld>
             <a:endParaRPr lang="en-US"/>
           </a:p>
@@ -3646,7 +4036,7 @@
           <a:p>
             <a:fld id="{34ED9B13-E5A7-4F15-9144-85834FFDF6F3}" type="datetimeFigureOut">
               <a:rPr lang="en-US" smtClean="0"/>
-              <a:t>7/12/2014</a:t>
+              <a:t>7/13/2014</a:t>
             </a:fld>
             <a:endParaRPr lang="en-US"/>
           </a:p>
@@ -3925,7 +4315,7 @@
           <a:p>
             <a:fld id="{34ED9B13-E5A7-4F15-9144-85834FFDF6F3}" type="datetimeFigureOut">
               <a:rPr lang="en-US" smtClean="0"/>
-              <a:t>7/12/2014</a:t>
+              <a:t>7/13/2014</a:t>
             </a:fld>
             <a:endParaRPr lang="en-US"/>
           </a:p>
@@ -4586,7 +4976,6 @@
               <a:rPr lang="en-US" sz="2400" dirty="0"/>
               <a:t>APPS</a:t>
             </a:r>
-            <a:endParaRPr lang="en-US" sz="2400" dirty="0"/>
           </a:p>
         </p:txBody>
       </p:sp>
@@ -4711,11 +5100,6 @@
               </a:rPr>
               <a:t>That Conference 2014</a:t>
             </a:r>
-            <a:endParaRPr lang="en-US" sz="2400" dirty="0" smtClean="0">
-              <a:solidFill>
-                <a:schemeClr val="bg1"/>
-              </a:solidFill>
-            </a:endParaRPr>
           </a:p>
         </p:txBody>
       </p:sp>
@@ -5217,15 +5601,7 @@
                   <a:schemeClr val="bg1"/>
                 </a:solidFill>
               </a:rPr>
-              <a:t>Notable </a:t>
-            </a:r>
-            <a:r>
-              <a:rPr lang="en-US" dirty="0" smtClean="0">
-                <a:solidFill>
-                  <a:schemeClr val="bg1"/>
-                </a:solidFill>
-              </a:rPr>
-              <a:t>Features:</a:t>
+              <a:t>Notable Features:</a:t>
             </a:r>
           </a:p>
           <a:p>
@@ -5241,11 +5617,6 @@
               </a:rPr>
               <a:t>Initial version created in days</a:t>
             </a:r>
-            <a:endParaRPr lang="en-US" dirty="0" smtClean="0">
-              <a:solidFill>
-                <a:schemeClr val="bg1"/>
-              </a:solidFill>
-            </a:endParaRPr>
           </a:p>
           <a:p>
             <a:pPr marL="285750" indent="-285750">
@@ -5286,23 +5657,7 @@
                   <a:schemeClr val="bg1"/>
                 </a:solidFill>
               </a:rPr>
-              <a:t>10,000 </a:t>
-            </a:r>
-            <a:r>
-              <a:rPr lang="en-US" dirty="0" smtClean="0">
-                <a:solidFill>
-                  <a:schemeClr val="bg1"/>
-                </a:solidFill>
-              </a:rPr>
-              <a:t>paying users </a:t>
-            </a:r>
-            <a:r>
-              <a:rPr lang="en-US" dirty="0" smtClean="0">
-                <a:solidFill>
-                  <a:schemeClr val="bg1"/>
-                </a:solidFill>
-              </a:rPr>
-              <a:t>in 1 year</a:t>
+              <a:t>10,000 paying users in 1 year</a:t>
             </a:r>
             <a:endParaRPr lang="en-US" dirty="0">
               <a:solidFill>
@@ -5755,12 +6110,13 @@
             <a:pPr lvl="1"/>
             <a:r>
               <a:rPr lang="en-US" i="0" dirty="0" smtClean="0"/>
-              <a:t>Styling (CSS) via </a:t>
-            </a:r>
-            <a:r>
-              <a:rPr lang="en-US" b="1" i="0" dirty="0" smtClean="0"/>
-              <a:t>Kendo UI</a:t>
-            </a:r>
+              <a:t>Styling (</a:t>
+            </a:r>
+            <a:r>
+              <a:rPr lang="en-US" i="0" dirty="0" smtClean="0"/>
+              <a:t>CSS)</a:t>
+            </a:r>
+            <a:endParaRPr lang="en-US" b="1" i="0" dirty="0" smtClean="0"/>
           </a:p>
           <a:p>
             <a:pPr marL="0" indent="0">
@@ -5785,15 +6141,11 @@
             <a:pPr lvl="1"/>
             <a:r>
               <a:rPr lang="en-US" i="0" dirty="0"/>
-              <a:t>Compiled app via </a:t>
-            </a:r>
-            <a:r>
-              <a:rPr lang="en-US" b="1" i="0" dirty="0"/>
-              <a:t>PhoneGap </a:t>
-            </a:r>
-            <a:r>
-              <a:rPr lang="en-US" b="1" i="0" dirty="0" smtClean="0"/>
-              <a:t>Build</a:t>
+              <a:t>Compiled </a:t>
+            </a:r>
+            <a:r>
+              <a:rPr lang="en-US" i="0" dirty="0" smtClean="0"/>
+              <a:t>app</a:t>
             </a:r>
             <a:endParaRPr lang="en-US" i="0" dirty="0" smtClean="0"/>
           </a:p>
@@ -5801,12 +6153,13 @@
             <a:pPr lvl="1"/>
             <a:r>
               <a:rPr lang="en-US" i="0" dirty="0" smtClean="0"/>
-              <a:t>Device APIs: </a:t>
-            </a:r>
-            <a:r>
-              <a:rPr lang="en-US" b="1" i="0" dirty="0" smtClean="0"/>
-              <a:t>PhoneGap</a:t>
-            </a:r>
+              <a:t>Device </a:t>
+            </a:r>
+            <a:r>
+              <a:rPr lang="en-US" i="0" dirty="0" smtClean="0"/>
+              <a:t>APIs</a:t>
+            </a:r>
+            <a:endParaRPr lang="en-US" b="1" i="0" dirty="0" smtClean="0"/>
           </a:p>
         </p:txBody>
       </p:sp>
@@ -6528,6 +6881,98 @@
       </p:grpSpPr>
       <p:sp>
         <p:nvSpPr>
+          <p:cNvPr id="8" name="Rectangle 7"/>
+          <p:cNvSpPr/>
+          <p:nvPr/>
+        </p:nvSpPr>
+        <p:spPr>
+          <a:xfrm>
+            <a:off x="5105400" y="4648200"/>
+            <a:ext cx="3581400" cy="1447800"/>
+          </a:xfrm>
+          <a:prstGeom prst="rect">
+            <a:avLst/>
+          </a:prstGeom>
+          <a:solidFill>
+            <a:schemeClr val="tx1"/>
+          </a:solidFill>
+          <a:ln>
+            <a:noFill/>
+          </a:ln>
+        </p:spPr>
+        <p:style>
+          <a:lnRef idx="2">
+            <a:schemeClr val="accent1">
+              <a:shade val="50000"/>
+            </a:schemeClr>
+          </a:lnRef>
+          <a:fillRef idx="1">
+            <a:schemeClr val="accent1"/>
+          </a:fillRef>
+          <a:effectRef idx="0">
+            <a:schemeClr val="accent1"/>
+          </a:effectRef>
+          <a:fontRef idx="minor">
+            <a:schemeClr val="lt1"/>
+          </a:fontRef>
+        </p:style>
+        <p:txBody>
+          <a:bodyPr rtlCol="0" anchor="ctr"/>
+          <a:lstStyle/>
+          <a:p>
+            <a:pPr algn="ctr"/>
+            <a:endParaRPr lang="en-US"/>
+          </a:p>
+        </p:txBody>
+      </p:sp>
+      <p:sp>
+        <p:nvSpPr>
+          <p:cNvPr id="7" name="Rounded Rectangle 6"/>
+          <p:cNvSpPr/>
+          <p:nvPr/>
+        </p:nvSpPr>
+        <p:spPr>
+          <a:xfrm>
+            <a:off x="1371600" y="2286000"/>
+            <a:ext cx="2743200" cy="2209800"/>
+          </a:xfrm>
+          <a:prstGeom prst="roundRect">
+            <a:avLst/>
+          </a:prstGeom>
+          <a:noFill/>
+          <a:ln>
+            <a:solidFill>
+              <a:srgbClr val="FF0000"/>
+            </a:solidFill>
+          </a:ln>
+        </p:spPr>
+        <p:style>
+          <a:lnRef idx="2">
+            <a:schemeClr val="accent1">
+              <a:shade val="50000"/>
+            </a:schemeClr>
+          </a:lnRef>
+          <a:fillRef idx="1">
+            <a:schemeClr val="accent1"/>
+          </a:fillRef>
+          <a:effectRef idx="0">
+            <a:schemeClr val="accent1"/>
+          </a:effectRef>
+          <a:fontRef idx="minor">
+            <a:schemeClr val="lt1"/>
+          </a:fontRef>
+        </p:style>
+        <p:txBody>
+          <a:bodyPr rtlCol="0" anchor="ctr"/>
+          <a:lstStyle/>
+          <a:p>
+            <a:pPr algn="ctr"/>
+            <a:endParaRPr lang="en-US"/>
+          </a:p>
+        </p:txBody>
+      </p:sp>
+      <p:sp>
+        <p:nvSpPr>
           <p:cNvPr id="2" name="Content Placeholder 1"/>
           <p:cNvSpPr>
             <a:spLocks noGrp="1"/>
@@ -6814,9 +7259,134 @@
   <p:timing>
     <p:tnLst>
       <p:par>
-        <p:cTn id="1" dur="indefinite" restart="never" nodeType="tmRoot"/>
+        <p:cTn id="1" dur="indefinite" restart="never" nodeType="tmRoot">
+          <p:childTnLst>
+            <p:seq concurrent="1" nextAc="seek">
+              <p:cTn id="2" dur="indefinite" nodeType="mainSeq">
+                <p:childTnLst>
+                  <p:par>
+                    <p:cTn id="3" fill="hold">
+                      <p:stCondLst>
+                        <p:cond delay="indefinite"/>
+                      </p:stCondLst>
+                      <p:childTnLst>
+                        <p:par>
+                          <p:cTn id="4" fill="hold">
+                            <p:stCondLst>
+                              <p:cond delay="0"/>
+                            </p:stCondLst>
+                            <p:childTnLst>
+                              <p:par>
+                                <p:cTn id="5" presetID="42" presetClass="entr" presetSubtype="0" fill="hold" grpId="0" nodeType="clickEffect">
+                                  <p:stCondLst>
+                                    <p:cond delay="0"/>
+                                  </p:stCondLst>
+                                  <p:childTnLst>
+                                    <p:set>
+                                      <p:cBhvr>
+                                        <p:cTn id="6" dur="1" fill="hold">
+                                          <p:stCondLst>
+                                            <p:cond delay="0"/>
+                                          </p:stCondLst>
+                                        </p:cTn>
+                                        <p:tgtEl>
+                                          <p:spTgt spid="7"/>
+                                        </p:tgtEl>
+                                        <p:attrNameLst>
+                                          <p:attrName>style.visibility</p:attrName>
+                                        </p:attrNameLst>
+                                      </p:cBhvr>
+                                      <p:to>
+                                        <p:strVal val="visible"/>
+                                      </p:to>
+                                    </p:set>
+                                    <p:animEffect transition="in" filter="fade">
+                                      <p:cBhvr>
+                                        <p:cTn id="7" dur="1000"/>
+                                        <p:tgtEl>
+                                          <p:spTgt spid="7"/>
+                                        </p:tgtEl>
+                                      </p:cBhvr>
+                                    </p:animEffect>
+                                    <p:anim calcmode="lin" valueType="num">
+                                      <p:cBhvr>
+                                        <p:cTn id="8" dur="1000" fill="hold"/>
+                                        <p:tgtEl>
+                                          <p:spTgt spid="7"/>
+                                        </p:tgtEl>
+                                        <p:attrNameLst>
+                                          <p:attrName>ppt_x</p:attrName>
+                                        </p:attrNameLst>
+                                      </p:cBhvr>
+                                      <p:tavLst>
+                                        <p:tav tm="0">
+                                          <p:val>
+                                            <p:strVal val="#ppt_x"/>
+                                          </p:val>
+                                        </p:tav>
+                                        <p:tav tm="100000">
+                                          <p:val>
+                                            <p:strVal val="#ppt_x"/>
+                                          </p:val>
+                                        </p:tav>
+                                      </p:tavLst>
+                                    </p:anim>
+                                    <p:anim calcmode="lin" valueType="num">
+                                      <p:cBhvr>
+                                        <p:cTn id="9" dur="1000" fill="hold"/>
+                                        <p:tgtEl>
+                                          <p:spTgt spid="7"/>
+                                        </p:tgtEl>
+                                        <p:attrNameLst>
+                                          <p:attrName>ppt_y</p:attrName>
+                                        </p:attrNameLst>
+                                      </p:cBhvr>
+                                      <p:tavLst>
+                                        <p:tav tm="0">
+                                          <p:val>
+                                            <p:strVal val="#ppt_y+.1"/>
+                                          </p:val>
+                                        </p:tav>
+                                        <p:tav tm="100000">
+                                          <p:val>
+                                            <p:strVal val="#ppt_y"/>
+                                          </p:val>
+                                        </p:tav>
+                                      </p:tavLst>
+                                    </p:anim>
+                                  </p:childTnLst>
+                                </p:cTn>
+                              </p:par>
+                            </p:childTnLst>
+                          </p:cTn>
+                        </p:par>
+                      </p:childTnLst>
+                    </p:cTn>
+                  </p:par>
+                </p:childTnLst>
+              </p:cTn>
+              <p:prevCondLst>
+                <p:cond evt="onPrev" delay="0">
+                  <p:tgtEl>
+                    <p:sldTgt/>
+                  </p:tgtEl>
+                </p:cond>
+              </p:prevCondLst>
+              <p:nextCondLst>
+                <p:cond evt="onNext" delay="0">
+                  <p:tgtEl>
+                    <p:sldTgt/>
+                  </p:tgtEl>
+                </p:cond>
+              </p:nextCondLst>
+            </p:seq>
+          </p:childTnLst>
+        </p:cTn>
       </p:par>
     </p:tnLst>
+    <p:bldLst>
+      <p:bldP spid="7" grpId="0" animBg="1"/>
+    </p:bldLst>
   </p:timing>
 </p:sld>
 </file>
@@ -6840,6 +7410,54 @@
       </p:grpSpPr>
       <p:sp>
         <p:nvSpPr>
+          <p:cNvPr id="4" name="Rectangle 3"/>
+          <p:cNvSpPr/>
+          <p:nvPr/>
+        </p:nvSpPr>
+        <p:spPr>
+          <a:xfrm>
+            <a:off x="152400" y="1066800"/>
+            <a:ext cx="8867775" cy="5105400"/>
+          </a:xfrm>
+          <a:prstGeom prst="rect">
+            <a:avLst/>
+          </a:prstGeom>
+          <a:solidFill>
+            <a:schemeClr val="tx1"/>
+          </a:solidFill>
+          <a:ln>
+            <a:solidFill>
+              <a:schemeClr val="tx1"/>
+            </a:solidFill>
+          </a:ln>
+        </p:spPr>
+        <p:style>
+          <a:lnRef idx="2">
+            <a:schemeClr val="accent1">
+              <a:shade val="50000"/>
+            </a:schemeClr>
+          </a:lnRef>
+          <a:fillRef idx="1">
+            <a:schemeClr val="accent1"/>
+          </a:fillRef>
+          <a:effectRef idx="0">
+            <a:schemeClr val="accent1"/>
+          </a:effectRef>
+          <a:fontRef idx="minor">
+            <a:schemeClr val="lt1"/>
+          </a:fontRef>
+        </p:style>
+        <p:txBody>
+          <a:bodyPr rtlCol="0" anchor="ctr"/>
+          <a:lstStyle/>
+          <a:p>
+            <a:pPr algn="ctr"/>
+            <a:endParaRPr lang="en-US"/>
+          </a:p>
+        </p:txBody>
+      </p:sp>
+      <p:sp>
+        <p:nvSpPr>
           <p:cNvPr id="3" name="Title 2"/>
           <p:cNvSpPr>
             <a:spLocks noGrp="1"/>
@@ -6850,19 +7468,17 @@
         </p:nvSpPr>
         <p:spPr>
           <a:xfrm>
-            <a:off x="609600" y="228600"/>
-            <a:ext cx="2073348" cy="457200"/>
-          </a:xfrm>
-        </p:spPr>
-        <p:txBody>
-          <a:bodyPr>
-            <a:normAutofit fontScale="90000"/>
-          </a:bodyPr>
+            <a:off x="2971800" y="381000"/>
+            <a:ext cx="3429000" cy="685800"/>
+          </a:xfrm>
+        </p:spPr>
+        <p:txBody>
+          <a:bodyPr/>
           <a:lstStyle/>
           <a:p>
             <a:r>
               <a:rPr lang="en-US" dirty="0" smtClean="0"/>
-              <a:t>Kendo UI</a:t>
+              <a:t>Kendo UI Mobile</a:t>
             </a:r>
             <a:endParaRPr lang="en-US" dirty="0"/>
           </a:p>
@@ -6870,7 +7486,7 @@
       </p:sp>
       <p:pic>
         <p:nvPicPr>
-          <p:cNvPr id="1026" name="Picture 2"/>
+          <p:cNvPr id="1027" name="Picture 3"/>
           <p:cNvPicPr>
             <a:picLocks noChangeAspect="1" noChangeArrowheads="1"/>
           </p:cNvPicPr>
@@ -6891,8 +7507,8 @@
         </p:blipFill>
         <p:spPr bwMode="auto">
           <a:xfrm>
-            <a:off x="0" y="1100137"/>
-            <a:ext cx="13702952" cy="4238625"/>
+            <a:off x="304800" y="1219200"/>
+            <a:ext cx="3724275" cy="1809750"/>
           </a:xfrm>
           <a:prstGeom prst="rect">
             <a:avLst/>
@@ -6922,10 +7538,172 @@
           </a:extLst>
         </p:spPr>
       </p:pic>
+      <p:pic>
+        <p:nvPicPr>
+          <p:cNvPr id="1028" name="Picture 4"/>
+          <p:cNvPicPr>
+            <a:picLocks noChangeAspect="1" noChangeArrowheads="1"/>
+          </p:cNvPicPr>
+          <p:nvPr/>
+        </p:nvPicPr>
+        <p:blipFill>
+          <a:blip r:embed="rId3">
+            <a:extLst>
+              <a:ext uri="{28A0092B-C50C-407E-A947-70E740481C1C}">
+                <a14:useLocalDpi xmlns:a14="http://schemas.microsoft.com/office/drawing/2010/main" val="0"/>
+              </a:ext>
+            </a:extLst>
+          </a:blip>
+          <a:srcRect/>
+          <a:stretch>
+            <a:fillRect/>
+          </a:stretch>
+        </p:blipFill>
+        <p:spPr bwMode="auto">
+          <a:xfrm>
+            <a:off x="4724400" y="1219200"/>
+            <a:ext cx="3781425" cy="1666875"/>
+          </a:xfrm>
+          <a:prstGeom prst="rect">
+            <a:avLst/>
+          </a:prstGeom>
+          <a:noFill/>
+          <a:ln>
+            <a:noFill/>
+          </a:ln>
+          <a:extLst>
+            <a:ext uri="{909E8E84-426E-40DD-AFC4-6F175D3DCCD1}">
+              <a14:hiddenFill xmlns:a14="http://schemas.microsoft.com/office/drawing/2010/main">
+                <a:solidFill>
+                  <a:schemeClr val="accent1"/>
+                </a:solidFill>
+              </a14:hiddenFill>
+            </a:ext>
+            <a:ext uri="{91240B29-F687-4F45-9708-019B960494DF}">
+              <a14:hiddenLine xmlns:a14="http://schemas.microsoft.com/office/drawing/2010/main" w="9525">
+                <a:solidFill>
+                  <a:schemeClr val="tx1"/>
+                </a:solidFill>
+                <a:miter lim="800000"/>
+                <a:headEnd/>
+                <a:tailEnd/>
+              </a14:hiddenLine>
+            </a:ext>
+          </a:extLst>
+        </p:spPr>
+      </p:pic>
+      <p:pic>
+        <p:nvPicPr>
+          <p:cNvPr id="1029" name="Picture 5"/>
+          <p:cNvPicPr>
+            <a:picLocks noChangeAspect="1" noChangeArrowheads="1"/>
+          </p:cNvPicPr>
+          <p:nvPr/>
+        </p:nvPicPr>
+        <p:blipFill>
+          <a:blip r:embed="rId4">
+            <a:extLst>
+              <a:ext uri="{28A0092B-C50C-407E-A947-70E740481C1C}">
+                <a14:useLocalDpi xmlns:a14="http://schemas.microsoft.com/office/drawing/2010/main" val="0"/>
+              </a:ext>
+            </a:extLst>
+          </a:blip>
+          <a:srcRect/>
+          <a:stretch>
+            <a:fillRect/>
+          </a:stretch>
+        </p:blipFill>
+        <p:spPr bwMode="auto">
+          <a:xfrm>
+            <a:off x="381000" y="3733800"/>
+            <a:ext cx="3867150" cy="2019300"/>
+          </a:xfrm>
+          <a:prstGeom prst="rect">
+            <a:avLst/>
+          </a:prstGeom>
+          <a:noFill/>
+          <a:ln>
+            <a:noFill/>
+          </a:ln>
+          <a:extLst>
+            <a:ext uri="{909E8E84-426E-40DD-AFC4-6F175D3DCCD1}">
+              <a14:hiddenFill xmlns:a14="http://schemas.microsoft.com/office/drawing/2010/main">
+                <a:solidFill>
+                  <a:schemeClr val="accent1"/>
+                </a:solidFill>
+              </a14:hiddenFill>
+            </a:ext>
+            <a:ext uri="{91240B29-F687-4F45-9708-019B960494DF}">
+              <a14:hiddenLine xmlns:a14="http://schemas.microsoft.com/office/drawing/2010/main" w="9525">
+                <a:solidFill>
+                  <a:schemeClr val="tx1"/>
+                </a:solidFill>
+                <a:miter lim="800000"/>
+                <a:headEnd/>
+                <a:tailEnd/>
+              </a14:hiddenLine>
+            </a:ext>
+          </a:extLst>
+        </p:spPr>
+      </p:pic>
+      <p:pic>
+        <p:nvPicPr>
+          <p:cNvPr id="1030" name="Picture 6"/>
+          <p:cNvPicPr>
+            <a:picLocks noChangeAspect="1" noChangeArrowheads="1"/>
+          </p:cNvPicPr>
+          <p:nvPr/>
+        </p:nvPicPr>
+        <p:blipFill>
+          <a:blip r:embed="rId5">
+            <a:extLst>
+              <a:ext uri="{28A0092B-C50C-407E-A947-70E740481C1C}">
+                <a14:useLocalDpi xmlns:a14="http://schemas.microsoft.com/office/drawing/2010/main" val="0"/>
+              </a:ext>
+            </a:extLst>
+          </a:blip>
+          <a:srcRect/>
+          <a:stretch>
+            <a:fillRect/>
+          </a:stretch>
+        </p:blipFill>
+        <p:spPr bwMode="auto">
+          <a:xfrm>
+            <a:off x="4572000" y="3760107"/>
+            <a:ext cx="4448175" cy="1885950"/>
+          </a:xfrm>
+          <a:prstGeom prst="rect">
+            <a:avLst/>
+          </a:prstGeom>
+          <a:noFill/>
+          <a:ln>
+            <a:noFill/>
+          </a:ln>
+          <a:extLst>
+            <a:ext uri="{909E8E84-426E-40DD-AFC4-6F175D3DCCD1}">
+              <a14:hiddenFill xmlns:a14="http://schemas.microsoft.com/office/drawing/2010/main">
+                <a:solidFill>
+                  <a:schemeClr val="accent1"/>
+                </a:solidFill>
+              </a14:hiddenFill>
+            </a:ext>
+            <a:ext uri="{91240B29-F687-4F45-9708-019B960494DF}">
+              <a14:hiddenLine xmlns:a14="http://schemas.microsoft.com/office/drawing/2010/main" w="9525">
+                <a:solidFill>
+                  <a:schemeClr val="tx1"/>
+                </a:solidFill>
+                <a:miter lim="800000"/>
+                <a:headEnd/>
+                <a:tailEnd/>
+              </a14:hiddenLine>
+            </a:ext>
+          </a:extLst>
+        </p:spPr>
+      </p:pic>
     </p:spTree>
     <p:extLst>
       <p:ext uri="{BB962C8B-B14F-4D97-AF65-F5344CB8AC3E}">
-        <p14:creationId xmlns:p14="http://schemas.microsoft.com/office/powerpoint/2010/main" val="4182239172"/>
+        <p14:creationId xmlns:p14="http://schemas.microsoft.com/office/powerpoint/2010/main" val="3383838965"/>
       </p:ext>
     </p:extLst>
   </p:cSld>
@@ -6961,6 +7739,54 @@
       </p:grpSpPr>
       <p:sp>
         <p:nvSpPr>
+          <p:cNvPr id="7" name="Rectangle 6"/>
+          <p:cNvSpPr/>
+          <p:nvPr/>
+        </p:nvSpPr>
+        <p:spPr>
+          <a:xfrm>
+            <a:off x="2362199" y="1371600"/>
+            <a:ext cx="5257801" cy="5133975"/>
+          </a:xfrm>
+          <a:prstGeom prst="rect">
+            <a:avLst/>
+          </a:prstGeom>
+          <a:solidFill>
+            <a:schemeClr val="tx1"/>
+          </a:solidFill>
+          <a:ln>
+            <a:solidFill>
+              <a:schemeClr val="tx1"/>
+            </a:solidFill>
+          </a:ln>
+        </p:spPr>
+        <p:style>
+          <a:lnRef idx="2">
+            <a:schemeClr val="accent1">
+              <a:shade val="50000"/>
+            </a:schemeClr>
+          </a:lnRef>
+          <a:fillRef idx="1">
+            <a:schemeClr val="accent1"/>
+          </a:fillRef>
+          <a:effectRef idx="0">
+            <a:schemeClr val="accent1"/>
+          </a:effectRef>
+          <a:fontRef idx="minor">
+            <a:schemeClr val="lt1"/>
+          </a:fontRef>
+        </p:style>
+        <p:txBody>
+          <a:bodyPr rtlCol="0" anchor="ctr"/>
+          <a:lstStyle/>
+          <a:p>
+            <a:pPr algn="ctr"/>
+            <a:endParaRPr lang="en-US"/>
+          </a:p>
+        </p:txBody>
+      </p:sp>
+      <p:sp>
+        <p:nvSpPr>
           <p:cNvPr id="3" name="Title 2"/>
           <p:cNvSpPr>
             <a:spLocks noGrp="1"/>
@@ -6971,17 +7797,23 @@
         </p:nvSpPr>
         <p:spPr>
           <a:xfrm>
-            <a:off x="533400" y="152400"/>
-            <a:ext cx="2073348" cy="990600"/>
-          </a:xfrm>
-        </p:spPr>
-        <p:txBody>
-          <a:bodyPr/>
+            <a:off x="2743200" y="457200"/>
+            <a:ext cx="3886200" cy="457200"/>
+          </a:xfrm>
+        </p:spPr>
+        <p:txBody>
+          <a:bodyPr>
+            <a:normAutofit fontScale="90000"/>
+          </a:bodyPr>
           <a:lstStyle/>
           <a:p>
             <a:r>
               <a:rPr lang="en-US" dirty="0" smtClean="0"/>
-              <a:t>Kendo UI Mobile</a:t>
+              <a:t>Kendo </a:t>
+            </a:r>
+            <a:r>
+              <a:rPr lang="en-US" dirty="0" smtClean="0"/>
+              <a:t>UI Framework</a:t>
             </a:r>
             <a:endParaRPr lang="en-US" dirty="0"/>
           </a:p>
@@ -6996,7 +7828,7 @@
           <p:nvPr/>
         </p:nvPicPr>
         <p:blipFill>
-          <a:blip r:embed="rId2">
+          <a:blip r:embed="rId3">
             <a:extLst>
               <a:ext uri="{28A0092B-C50C-407E-A947-70E740481C1C}">
                 <a14:useLocalDpi xmlns:a14="http://schemas.microsoft.com/office/drawing/2010/main" val="0"/>
@@ -7010,8 +7842,8 @@
         </p:blipFill>
         <p:spPr bwMode="auto">
           <a:xfrm>
-            <a:off x="0" y="1285875"/>
-            <a:ext cx="11410950" cy="4286250"/>
+            <a:off x="2762250" y="1447800"/>
+            <a:ext cx="4552950" cy="1619250"/>
           </a:xfrm>
           <a:prstGeom prst="rect">
             <a:avLst/>
@@ -7041,10 +7873,148 @@
           </a:extLst>
         </p:spPr>
       </p:pic>
+      <p:pic>
+        <p:nvPicPr>
+          <p:cNvPr id="2051" name="Picture 3"/>
+          <p:cNvPicPr>
+            <a:picLocks noChangeAspect="1" noChangeArrowheads="1"/>
+          </p:cNvPicPr>
+          <p:nvPr/>
+        </p:nvPicPr>
+        <p:blipFill>
+          <a:blip r:embed="rId4">
+            <a:extLst>
+              <a:ext uri="{28A0092B-C50C-407E-A947-70E740481C1C}">
+                <a14:useLocalDpi xmlns:a14="http://schemas.microsoft.com/office/drawing/2010/main" val="0"/>
+              </a:ext>
+            </a:extLst>
+          </a:blip>
+          <a:srcRect/>
+          <a:stretch>
+            <a:fillRect/>
+          </a:stretch>
+        </p:blipFill>
+        <p:spPr bwMode="auto">
+          <a:xfrm>
+            <a:off x="2590800" y="3276600"/>
+            <a:ext cx="4476750" cy="1581150"/>
+          </a:xfrm>
+          <a:prstGeom prst="rect">
+            <a:avLst/>
+          </a:prstGeom>
+          <a:noFill/>
+          <a:ln>
+            <a:noFill/>
+          </a:ln>
+          <a:extLst>
+            <a:ext uri="{909E8E84-426E-40DD-AFC4-6F175D3DCCD1}">
+              <a14:hiddenFill xmlns:a14="http://schemas.microsoft.com/office/drawing/2010/main">
+                <a:solidFill>
+                  <a:schemeClr val="accent1"/>
+                </a:solidFill>
+              </a14:hiddenFill>
+            </a:ext>
+            <a:ext uri="{91240B29-F687-4F45-9708-019B960494DF}">
+              <a14:hiddenLine xmlns:a14="http://schemas.microsoft.com/office/drawing/2010/main" w="9525">
+                <a:solidFill>
+                  <a:schemeClr val="tx1"/>
+                </a:solidFill>
+                <a:miter lim="800000"/>
+                <a:headEnd/>
+                <a:tailEnd/>
+              </a14:hiddenLine>
+            </a:ext>
+          </a:extLst>
+        </p:spPr>
+      </p:pic>
+      <p:pic>
+        <p:nvPicPr>
+          <p:cNvPr id="2052" name="Picture 4"/>
+          <p:cNvPicPr>
+            <a:picLocks noChangeAspect="1" noChangeArrowheads="1"/>
+          </p:cNvPicPr>
+          <p:nvPr/>
+        </p:nvPicPr>
+        <p:blipFill>
+          <a:blip r:embed="rId5">
+            <a:extLst>
+              <a:ext uri="{28A0092B-C50C-407E-A947-70E740481C1C}">
+                <a14:useLocalDpi xmlns:a14="http://schemas.microsoft.com/office/drawing/2010/main" val="0"/>
+              </a:ext>
+            </a:extLst>
+          </a:blip>
+          <a:srcRect/>
+          <a:stretch>
+            <a:fillRect/>
+          </a:stretch>
+        </p:blipFill>
+        <p:spPr bwMode="auto">
+          <a:xfrm>
+            <a:off x="2590800" y="5029200"/>
+            <a:ext cx="4476750" cy="1476375"/>
+          </a:xfrm>
+          <a:prstGeom prst="rect">
+            <a:avLst/>
+          </a:prstGeom>
+          <a:noFill/>
+          <a:ln>
+            <a:noFill/>
+          </a:ln>
+          <a:extLst>
+            <a:ext uri="{909E8E84-426E-40DD-AFC4-6F175D3DCCD1}">
+              <a14:hiddenFill xmlns:a14="http://schemas.microsoft.com/office/drawing/2010/main">
+                <a:solidFill>
+                  <a:schemeClr val="accent1"/>
+                </a:solidFill>
+              </a14:hiddenFill>
+            </a:ext>
+            <a:ext uri="{91240B29-F687-4F45-9708-019B960494DF}">
+              <a14:hiddenLine xmlns:a14="http://schemas.microsoft.com/office/drawing/2010/main" w="9525">
+                <a:solidFill>
+                  <a:schemeClr val="tx1"/>
+                </a:solidFill>
+                <a:miter lim="800000"/>
+                <a:headEnd/>
+                <a:tailEnd/>
+              </a14:hiddenLine>
+            </a:ext>
+          </a:extLst>
+        </p:spPr>
+      </p:pic>
+      <p:sp>
+        <p:nvSpPr>
+          <p:cNvPr id="2" name="TextBox 1"/>
+          <p:cNvSpPr txBox="1"/>
+          <p:nvPr/>
+        </p:nvSpPr>
+        <p:spPr>
+          <a:xfrm>
+            <a:off x="8382000" y="6474023"/>
+            <a:ext cx="838200" cy="307777"/>
+          </a:xfrm>
+          <a:prstGeom prst="rect">
+            <a:avLst/>
+          </a:prstGeom>
+          <a:noFill/>
+        </p:spPr>
+        <p:txBody>
+          <a:bodyPr wrap="square" rtlCol="0">
+            <a:spAutoFit/>
+          </a:bodyPr>
+          <a:lstStyle/>
+          <a:p>
+            <a:r>
+              <a:rPr lang="en-US" sz="1400" dirty="0" smtClean="0"/>
+              <a:t>Demo</a:t>
+            </a:r>
+            <a:endParaRPr lang="en-US" sz="1400" dirty="0"/>
+          </a:p>
+        </p:txBody>
+      </p:sp>
     </p:spTree>
     <p:extLst>
       <p:ext uri="{BB962C8B-B14F-4D97-AF65-F5344CB8AC3E}">
-        <p14:creationId xmlns:p14="http://schemas.microsoft.com/office/powerpoint/2010/main" val="3383838965"/>
+        <p14:creationId xmlns:p14="http://schemas.microsoft.com/office/powerpoint/2010/main" val="4182239172"/>
       </p:ext>
     </p:extLst>
   </p:cSld>
@@ -7080,6 +8050,29 @@
       </p:grpSpPr>
       <p:sp>
         <p:nvSpPr>
+          <p:cNvPr id="2" name="Content Placeholder 1"/>
+          <p:cNvSpPr>
+            <a:spLocks noGrp="1"/>
+          </p:cNvSpPr>
+          <p:nvPr>
+            <p:ph sz="quarter" idx="13"/>
+          </p:nvPr>
+        </p:nvSpPr>
+        <p:spPr/>
+        <p:txBody>
+          <a:bodyPr/>
+          <a:lstStyle/>
+          <a:p>
+            <a:r>
+              <a:rPr lang="en-US" dirty="0" smtClean="0"/>
+              <a:t>TODO code sample</a:t>
+            </a:r>
+            <a:endParaRPr lang="en-US" dirty="0"/>
+          </a:p>
+        </p:txBody>
+      </p:sp>
+      <p:sp>
+        <p:nvSpPr>
           <p:cNvPr id="3" name="Title 2"/>
           <p:cNvSpPr>
             <a:spLocks noGrp="1"/>
@@ -7090,68 +8083,21 @@
         </p:nvSpPr>
         <p:spPr/>
         <p:txBody>
-          <a:bodyPr>
-            <a:normAutofit fontScale="90000"/>
-          </a:bodyPr>
-          <a:lstStyle/>
-          <a:p>
-            <a:r>
-              <a:rPr lang="en-US" dirty="0" err="1" smtClean="0"/>
-              <a:t>Phonegap</a:t>
-            </a:r>
+          <a:bodyPr/>
+          <a:lstStyle/>
+          <a:p>
             <a:r>
               <a:rPr lang="en-US" dirty="0" smtClean="0"/>
-              <a:t> build – putting it together</a:t>
+              <a:t>Responsive?</a:t>
             </a:r>
             <a:endParaRPr lang="en-US" dirty="0"/>
           </a:p>
         </p:txBody>
       </p:sp>
-      <p:pic>
-        <p:nvPicPr>
-          <p:cNvPr id="5122" name="Picture 2" descr="http://pic.dhe.ibm.com/infocenter/wrklight/v5r0m5/topic/com.ibm.worklight.help.doc/devref/Pictures/app_types.jpg"/>
-          <p:cNvPicPr>
-            <a:picLocks noChangeAspect="1" noChangeArrowheads="1"/>
-          </p:cNvPicPr>
-          <p:nvPr/>
-        </p:nvPicPr>
-        <p:blipFill>
-          <a:blip r:embed="rId3">
-            <a:extLst>
-              <a:ext uri="{28A0092B-C50C-407E-A947-70E740481C1C}">
-                <a14:useLocalDpi xmlns:a14="http://schemas.microsoft.com/office/drawing/2010/main" val="0"/>
-              </a:ext>
-            </a:extLst>
-          </a:blip>
-          <a:srcRect/>
-          <a:stretch>
-            <a:fillRect/>
-          </a:stretch>
-        </p:blipFill>
-        <p:spPr bwMode="auto">
-          <a:xfrm>
-            <a:off x="1524000" y="2057400"/>
-            <a:ext cx="6477000" cy="3343275"/>
-          </a:xfrm>
-          <a:prstGeom prst="rect">
-            <a:avLst/>
-          </a:prstGeom>
-          <a:noFill/>
-          <a:extLst>
-            <a:ext uri="{909E8E84-426E-40DD-AFC4-6F175D3DCCD1}">
-              <a14:hiddenFill xmlns:a14="http://schemas.microsoft.com/office/drawing/2010/main">
-                <a:solidFill>
-                  <a:srgbClr val="FFFFFF"/>
-                </a:solidFill>
-              </a14:hiddenFill>
-            </a:ext>
-          </a:extLst>
-        </p:spPr>
-      </p:pic>
     </p:spTree>
     <p:extLst>
       <p:ext uri="{BB962C8B-B14F-4D97-AF65-F5344CB8AC3E}">
-        <p14:creationId xmlns:p14="http://schemas.microsoft.com/office/powerpoint/2010/main" val="2683195493"/>
+        <p14:creationId xmlns:p14="http://schemas.microsoft.com/office/powerpoint/2010/main" val="1466882383"/>
       </p:ext>
     </p:extLst>
   </p:cSld>
@@ -7301,15 +8247,7 @@
                   <a:schemeClr val="bg1"/>
                 </a:solidFill>
               </a:rPr>
-              <a:t>Mobile app development </a:t>
-            </a:r>
-            <a:r>
-              <a:rPr lang="en-US" sz="2600" b="1" dirty="0" smtClean="0">
-                <a:solidFill>
-                  <a:schemeClr val="bg1"/>
-                </a:solidFill>
-              </a:rPr>
-              <a:t>for Netkosoft </a:t>
+              <a:t>Mobile app development for Netkosoft </a:t>
             </a:r>
             <a:r>
               <a:rPr lang="en-US" sz="2600" dirty="0" smtClean="0">
@@ -7319,11 +8257,6 @@
               </a:rPr>
               <a:t>– 1 year</a:t>
             </a:r>
-            <a:endParaRPr lang="en-US" sz="2600" dirty="0" smtClean="0">
-              <a:solidFill>
-                <a:schemeClr val="bg1"/>
-              </a:solidFill>
-            </a:endParaRPr>
           </a:p>
           <a:p>
             <a:pPr marL="742950" lvl="1" indent="-285750">
@@ -7350,21 +8283,8 @@
                   <a:schemeClr val="bg1"/>
                 </a:solidFill>
               </a:rPr>
-              <a:t>Entirely PhoneGap-based, </a:t>
-            </a:r>
-            <a:r>
-              <a:rPr lang="en-US" sz="2600" dirty="0" smtClean="0">
-                <a:solidFill>
-                  <a:schemeClr val="bg1"/>
-                </a:solidFill>
-              </a:rPr>
-              <a:t>Hybrid apps</a:t>
-            </a:r>
-            <a:endParaRPr lang="en-US" sz="2600" dirty="0" smtClean="0">
-              <a:solidFill>
-                <a:schemeClr val="bg1"/>
-              </a:solidFill>
-            </a:endParaRPr>
+              <a:t>Entirely PhoneGap-based, Hybrid apps</a:t>
+            </a:r>
           </a:p>
           <a:p>
             <a:pPr marL="742950" lvl="1" indent="-285750">
@@ -7417,29 +8337,8 @@
                   <a:schemeClr val="bg1"/>
                 </a:solidFill>
               </a:rPr>
-              <a:t>Technology trends, </a:t>
-            </a:r>
-            <a:r>
-              <a:rPr lang="en-US" sz="2600" dirty="0" smtClean="0">
-                <a:solidFill>
-                  <a:schemeClr val="bg1"/>
-                </a:solidFill>
-              </a:rPr>
-              <a:t>programming, </a:t>
-            </a:r>
-            <a:r>
-              <a:rPr lang="en-US" sz="2600" dirty="0" smtClean="0">
-                <a:solidFill>
-                  <a:schemeClr val="bg1"/>
-                </a:solidFill>
-              </a:rPr>
-              <a:t>PhoneGap</a:t>
-            </a:r>
-            <a:endParaRPr lang="en-US" sz="2600" dirty="0" smtClean="0">
-              <a:solidFill>
-                <a:schemeClr val="bg1"/>
-              </a:solidFill>
-            </a:endParaRPr>
+              <a:t>Technology trends, programming, PhoneGap</a:t>
+            </a:r>
           </a:p>
           <a:p>
             <a:pPr marL="285750" indent="-285750">
@@ -7503,19 +8402,20 @@
         </p:nvSpPr>
         <p:spPr>
           <a:xfrm>
-            <a:off x="533400" y="914400"/>
-            <a:ext cx="7924800" cy="762000"/>
-          </a:xfrm>
-        </p:spPr>
-        <p:txBody>
-          <a:bodyPr>
-            <a:normAutofit fontScale="85000" lnSpcReduction="20000"/>
-          </a:bodyPr>
-          <a:lstStyle/>
-          <a:p>
+            <a:off x="914400" y="990600"/>
+            <a:ext cx="1981200" cy="609600"/>
+          </a:xfrm>
+        </p:spPr>
+        <p:txBody>
+          <a:bodyPr/>
+          <a:lstStyle/>
+          <a:p>
+            <a:pPr marL="0" indent="0">
+              <a:buNone/>
+            </a:pPr>
             <a:r>
               <a:rPr lang="en-US" dirty="0" smtClean="0"/>
-              <a:t>Easily build multiple versions of app from same codebase:</a:t>
+              <a:t>Without:</a:t>
             </a:r>
             <a:endParaRPr lang="en-US" dirty="0"/>
           </a:p>
@@ -7531,29 +8431,22 @@
             <p:ph type="title"/>
           </p:nvPr>
         </p:nvSpPr>
-        <p:spPr>
-          <a:xfrm>
-            <a:off x="1219200" y="152400"/>
-            <a:ext cx="8077200" cy="533400"/>
-          </a:xfrm>
-        </p:spPr>
-        <p:txBody>
-          <a:bodyPr>
-            <a:noAutofit/>
-          </a:bodyPr>
-          <a:lstStyle/>
-          <a:p>
-            <a:r>
-              <a:rPr lang="en-US" sz="2500" dirty="0" smtClean="0"/>
-              <a:t>NOTABLE PHONEGAP BUILD FEATURES</a:t>
-            </a:r>
-            <a:endParaRPr lang="en-US" sz="2500" dirty="0"/>
+        <p:spPr/>
+        <p:txBody>
+          <a:bodyPr/>
+          <a:lstStyle/>
+          <a:p>
+            <a:r>
+              <a:rPr lang="en-US" dirty="0" smtClean="0"/>
+              <a:t>Much better!</a:t>
+            </a:r>
+            <a:endParaRPr lang="en-US" dirty="0"/>
           </a:p>
         </p:txBody>
       </p:sp>
       <p:pic>
         <p:nvPicPr>
-          <p:cNvPr id="3075" name="Picture 3"/>
+          <p:cNvPr id="4" name="Picture 2" descr="C:\sourcecode\fixmyq-android\fixmyq-android\MyNetflixQ\market\screenshot_instant_expiring_sort.png"/>
           <p:cNvPicPr>
             <a:picLocks noChangeAspect="1" noChangeArrowheads="1"/>
           </p:cNvPicPr>
@@ -7574,33 +8467,232 @@
         </p:blipFill>
         <p:spPr bwMode="auto">
           <a:xfrm>
-            <a:off x="242888" y="881063"/>
-            <a:ext cx="8658225" cy="5095875"/>
+            <a:off x="990599" y="1574704"/>
+            <a:ext cx="3078537" cy="5130895"/>
           </a:xfrm>
           <a:prstGeom prst="rect">
             <a:avLst/>
           </a:prstGeom>
           <a:noFill/>
-          <a:ln>
-            <a:noFill/>
-          </a:ln>
           <a:extLst>
             <a:ext uri="{909E8E84-426E-40DD-AFC4-6F175D3DCCD1}">
               <a14:hiddenFill xmlns:a14="http://schemas.microsoft.com/office/drawing/2010/main">
                 <a:solidFill>
-                  <a:schemeClr val="accent1"/>
+                  <a:srgbClr val="FFFFFF"/>
                 </a:solidFill>
               </a14:hiddenFill>
             </a:ext>
-            <a:ext uri="{91240B29-F687-4F45-9708-019B960494DF}">
-              <a14:hiddenLine xmlns:a14="http://schemas.microsoft.com/office/drawing/2010/main" w="9525">
+          </a:extLst>
+        </p:spPr>
+      </p:pic>
+      <p:sp>
+        <p:nvSpPr>
+          <p:cNvPr id="5" name="Content Placeholder 1"/>
+          <p:cNvSpPr txBox="1">
+            <a:spLocks/>
+          </p:cNvSpPr>
+          <p:nvPr/>
+        </p:nvSpPr>
+        <p:spPr>
+          <a:xfrm>
+            <a:off x="5105400" y="914400"/>
+            <a:ext cx="1981200" cy="609600"/>
+          </a:xfrm>
+          <a:prstGeom prst="rect">
+            <a:avLst/>
+          </a:prstGeom>
+        </p:spPr>
+        <p:txBody>
+          <a:bodyPr vert="horz" lIns="91440" tIns="45720" rIns="91440" bIns="45720" rtlCol="0">
+            <a:normAutofit/>
+          </a:bodyPr>
+          <a:lstStyle>
+            <a:lvl1pPr marL="274320" indent="-274320" algn="l" defTabSz="914400" rtl="0" eaLnBrk="1" latinLnBrk="0" hangingPunct="1">
+              <a:spcBef>
+                <a:spcPct val="20000"/>
+              </a:spcBef>
+              <a:buFont typeface="Arial" pitchFamily="34" charset="0"/>
+              <a:buChar char="•"/>
+              <a:defRPr sz="3200" i="1" kern="1200">
+                <a:solidFill>
+                  <a:schemeClr val="bg1"/>
+                </a:solidFill>
+                <a:latin typeface="+mn-lt"/>
+                <a:ea typeface="+mn-ea"/>
+                <a:cs typeface="+mn-cs"/>
+              </a:defRPr>
+            </a:lvl1pPr>
+            <a:lvl2pPr marL="742950" indent="-285750" algn="l" defTabSz="914400" rtl="0" eaLnBrk="1" latinLnBrk="0" hangingPunct="1">
+              <a:spcBef>
+                <a:spcPct val="20000"/>
+              </a:spcBef>
+              <a:buFont typeface="Arial" pitchFamily="34" charset="0"/>
+              <a:buChar char="–"/>
+              <a:defRPr sz="2800" i="1" kern="1200">
+                <a:solidFill>
+                  <a:schemeClr val="bg1"/>
+                </a:solidFill>
+                <a:latin typeface="+mn-lt"/>
+                <a:ea typeface="+mn-ea"/>
+                <a:cs typeface="+mn-cs"/>
+              </a:defRPr>
+            </a:lvl2pPr>
+            <a:lvl3pPr marL="1143000" indent="-228600" algn="l" defTabSz="914400" rtl="0" eaLnBrk="1" latinLnBrk="0" hangingPunct="1">
+              <a:spcBef>
+                <a:spcPct val="20000"/>
+              </a:spcBef>
+              <a:buFont typeface="Arial" pitchFamily="34" charset="0"/>
+              <a:buChar char="•"/>
+              <a:defRPr sz="1800" i="1" kern="1200">
+                <a:solidFill>
+                  <a:schemeClr val="bg1"/>
+                </a:solidFill>
+                <a:latin typeface="+mn-lt"/>
+                <a:ea typeface="+mn-ea"/>
+                <a:cs typeface="+mn-cs"/>
+              </a:defRPr>
+            </a:lvl3pPr>
+            <a:lvl4pPr marL="1600200" indent="-228600" algn="l" defTabSz="914400" rtl="0" eaLnBrk="1" latinLnBrk="0" hangingPunct="1">
+              <a:spcBef>
+                <a:spcPct val="20000"/>
+              </a:spcBef>
+              <a:buFont typeface="Arial" pitchFamily="34" charset="0"/>
+              <a:buChar char="–"/>
+              <a:defRPr sz="1800" i="1" kern="1200">
+                <a:solidFill>
+                  <a:schemeClr val="bg1"/>
+                </a:solidFill>
+                <a:latin typeface="+mn-lt"/>
+                <a:ea typeface="+mn-ea"/>
+                <a:cs typeface="+mn-cs"/>
+              </a:defRPr>
+            </a:lvl4pPr>
+            <a:lvl5pPr marL="2057400" indent="-228600" algn="l" defTabSz="914400" rtl="0" eaLnBrk="1" latinLnBrk="0" hangingPunct="1">
+              <a:spcBef>
+                <a:spcPct val="20000"/>
+              </a:spcBef>
+              <a:buFont typeface="Arial" pitchFamily="34" charset="0"/>
+              <a:buChar char="»"/>
+              <a:defRPr sz="1800" i="1" kern="1200">
+                <a:solidFill>
+                  <a:schemeClr val="bg1"/>
+                </a:solidFill>
+                <a:latin typeface="+mn-lt"/>
+                <a:ea typeface="+mn-ea"/>
+                <a:cs typeface="+mn-cs"/>
+              </a:defRPr>
+            </a:lvl5pPr>
+            <a:lvl6pPr marL="2514600" indent="-228600" algn="l" defTabSz="914400" rtl="0" eaLnBrk="1" latinLnBrk="0" hangingPunct="1">
+              <a:spcBef>
+                <a:spcPct val="20000"/>
+              </a:spcBef>
+              <a:buFont typeface="Arial" pitchFamily="34" charset="0"/>
+              <a:buChar char="•"/>
+              <a:defRPr sz="1800" i="1" kern="1200">
                 <a:solidFill>
                   <a:schemeClr val="tx1"/>
                 </a:solidFill>
-                <a:miter lim="800000"/>
-                <a:headEnd/>
-                <a:tailEnd/>
-              </a14:hiddenLine>
+                <a:latin typeface="+mn-lt"/>
+                <a:ea typeface="+mn-ea"/>
+                <a:cs typeface="+mn-cs"/>
+              </a:defRPr>
+            </a:lvl6pPr>
+            <a:lvl7pPr marL="2971800" indent="-228600" algn="l" defTabSz="914400" rtl="0" eaLnBrk="1" latinLnBrk="0" hangingPunct="1">
+              <a:spcBef>
+                <a:spcPct val="20000"/>
+              </a:spcBef>
+              <a:buFont typeface="Arial" pitchFamily="34" charset="0"/>
+              <a:buChar char="•"/>
+              <a:defRPr sz="1800" i="1" kern="1200">
+                <a:solidFill>
+                  <a:schemeClr val="tx1"/>
+                </a:solidFill>
+                <a:latin typeface="+mn-lt"/>
+                <a:ea typeface="+mn-ea"/>
+                <a:cs typeface="+mn-cs"/>
+              </a:defRPr>
+            </a:lvl7pPr>
+            <a:lvl8pPr marL="3429000" indent="-228600" algn="l" defTabSz="914400" rtl="0" eaLnBrk="1" latinLnBrk="0" hangingPunct="1">
+              <a:spcBef>
+                <a:spcPct val="20000"/>
+              </a:spcBef>
+              <a:buFont typeface="Arial" pitchFamily="34" charset="0"/>
+              <a:buChar char="•"/>
+              <a:defRPr sz="1800" i="1" kern="1200">
+                <a:solidFill>
+                  <a:schemeClr val="tx1"/>
+                </a:solidFill>
+                <a:latin typeface="+mn-lt"/>
+                <a:ea typeface="+mn-ea"/>
+                <a:cs typeface="+mn-cs"/>
+              </a:defRPr>
+            </a:lvl8pPr>
+            <a:lvl9pPr marL="3886200" indent="-228600" algn="l" defTabSz="914400" rtl="0" eaLnBrk="1" latinLnBrk="0" hangingPunct="1">
+              <a:spcBef>
+                <a:spcPct val="20000"/>
+              </a:spcBef>
+              <a:buFont typeface="Arial" pitchFamily="34" charset="0"/>
+              <a:buChar char="•"/>
+              <a:defRPr sz="1800" kern="1200">
+                <a:solidFill>
+                  <a:schemeClr val="tx1"/>
+                </a:solidFill>
+                <a:latin typeface="+mn-lt"/>
+                <a:ea typeface="+mn-ea"/>
+                <a:cs typeface="+mn-cs"/>
+              </a:defRPr>
+            </a:lvl9pPr>
+          </a:lstStyle>
+          <a:p>
+            <a:pPr marL="0" indent="0">
+              <a:buFont typeface="Arial" pitchFamily="34" charset="0"/>
+              <a:buNone/>
+            </a:pPr>
+            <a:r>
+              <a:rPr lang="en-US" dirty="0" smtClean="0"/>
+              <a:t>With:</a:t>
+            </a:r>
+            <a:endParaRPr lang="en-US" dirty="0"/>
+          </a:p>
+        </p:txBody>
+      </p:sp>
+      <p:pic>
+        <p:nvPicPr>
+          <p:cNvPr id="6" name="Picture 2" descr="https://s4.mzstatic.com/us/r30/Purple/v4/19/a1/11/19a11158-9c6c-bdcb-ae3f-85d89d51a539/mzl.ckfjgpxo.png?downloadKey=1402969696_b1547a092671ba7d7c1ded8edb08406c"/>
+          <p:cNvPicPr>
+            <a:picLocks noChangeAspect="1" noChangeArrowheads="1"/>
+          </p:cNvPicPr>
+          <p:nvPr/>
+        </p:nvPicPr>
+        <p:blipFill>
+          <a:blip r:embed="rId3">
+            <a:extLst>
+              <a:ext uri="{28A0092B-C50C-407E-A947-70E740481C1C}">
+                <a14:useLocalDpi xmlns:a14="http://schemas.microsoft.com/office/drawing/2010/main" val="0"/>
+              </a:ext>
+            </a:extLst>
+          </a:blip>
+          <a:srcRect/>
+          <a:stretch>
+            <a:fillRect/>
+          </a:stretch>
+        </p:blipFill>
+        <p:spPr bwMode="auto">
+          <a:xfrm>
+            <a:off x="5183107" y="1524000"/>
+            <a:ext cx="2747493" cy="4876800"/>
+          </a:xfrm>
+          <a:prstGeom prst="rect">
+            <a:avLst/>
+          </a:prstGeom>
+          <a:noFill/>
+          <a:extLst>
+            <a:ext uri="{909E8E84-426E-40DD-AFC4-6F175D3DCCD1}">
+              <a14:hiddenFill xmlns:a14="http://schemas.microsoft.com/office/drawing/2010/main">
+                <a:solidFill>
+                  <a:srgbClr val="FFFFFF"/>
+                </a:solidFill>
+              </a14:hiddenFill>
             </a:ext>
           </a:extLst>
         </p:spPr>
@@ -7608,7 +8700,7 @@
     </p:spTree>
     <p:extLst>
       <p:ext uri="{BB962C8B-B14F-4D97-AF65-F5344CB8AC3E}">
-        <p14:creationId xmlns:p14="http://schemas.microsoft.com/office/powerpoint/2010/main" val="2592480722"/>
+        <p14:creationId xmlns:p14="http://schemas.microsoft.com/office/powerpoint/2010/main" val="2952397307"/>
       </p:ext>
     </p:extLst>
   </p:cSld>
@@ -7652,147 +8744,77 @@
             <p:ph sz="quarter" idx="13"/>
           </p:nvPr>
         </p:nvSpPr>
-        <p:spPr>
-          <a:xfrm>
-            <a:off x="838200" y="1219200"/>
-            <a:ext cx="6172200" cy="4572000"/>
-          </a:xfrm>
-        </p:spPr>
-        <p:txBody>
-          <a:bodyPr>
-            <a:normAutofit fontScale="77500" lnSpcReduction="20000"/>
-          </a:bodyPr>
-          <a:lstStyle/>
-          <a:p>
-            <a:r>
-              <a:rPr lang="en-US" dirty="0" smtClean="0"/>
-              <a:t>Plugins</a:t>
-            </a:r>
-          </a:p>
-          <a:p>
-            <a:pPr lvl="1"/>
-            <a:r>
-              <a:rPr lang="en-US" dirty="0" smtClean="0"/>
-              <a:t>Fill in missing native functionality:</a:t>
-            </a:r>
-          </a:p>
-          <a:p>
-            <a:pPr lvl="2"/>
-            <a:r>
-              <a:rPr lang="en-US" dirty="0" smtClean="0"/>
-              <a:t>Camera interaction</a:t>
-            </a:r>
-          </a:p>
-          <a:p>
-            <a:pPr lvl="2"/>
-            <a:r>
-              <a:rPr lang="en-US" dirty="0" smtClean="0"/>
-              <a:t>In-app Browser</a:t>
-            </a:r>
-          </a:p>
-          <a:p>
-            <a:pPr lvl="2"/>
-            <a:r>
-              <a:rPr lang="en-US" dirty="0" smtClean="0"/>
-              <a:t>Google Analytics</a:t>
-            </a:r>
-          </a:p>
-          <a:p>
-            <a:pPr lvl="2"/>
-            <a:endParaRPr lang="en-US" dirty="0" smtClean="0"/>
-          </a:p>
-          <a:p>
-            <a:r>
-              <a:rPr lang="en-US" dirty="0" smtClean="0"/>
-              <a:t>Hydration</a:t>
-            </a:r>
-          </a:p>
-          <a:p>
-            <a:pPr lvl="1"/>
-            <a:r>
-              <a:rPr lang="en-US" dirty="0" smtClean="0"/>
-              <a:t>Automatically deploy new app versions to devices</a:t>
-            </a:r>
-          </a:p>
-          <a:p>
-            <a:pPr lvl="1"/>
-            <a:r>
-              <a:rPr lang="en-US" dirty="0" smtClean="0"/>
-              <a:t>Useful individually or with a team</a:t>
-            </a:r>
-          </a:p>
-          <a:p>
-            <a:pPr lvl="1"/>
-            <a:endParaRPr lang="en-US" dirty="0" smtClean="0"/>
-          </a:p>
-          <a:p>
-            <a:r>
-              <a:rPr lang="en-US" dirty="0" smtClean="0"/>
-              <a:t>Remote debugging</a:t>
-            </a:r>
-          </a:p>
-          <a:p>
-            <a:pPr lvl="1"/>
-            <a:r>
-              <a:rPr lang="en-US" dirty="0" smtClean="0"/>
-              <a:t>Review app code, storage, etc. all in real-time</a:t>
-            </a:r>
-          </a:p>
-          <a:p>
-            <a:pPr lvl="1"/>
-            <a:r>
-              <a:rPr lang="en-US" dirty="0" smtClean="0"/>
-              <a:t>Debug plugin behavior</a:t>
-            </a:r>
-          </a:p>
-        </p:txBody>
-      </p:sp>
-      <p:sp>
-        <p:nvSpPr>
-          <p:cNvPr id="3" name="Title 2"/>
-          <p:cNvSpPr>
-            <a:spLocks noGrp="1"/>
-          </p:cNvSpPr>
-          <p:nvPr>
-            <p:ph type="title"/>
-          </p:nvPr>
-        </p:nvSpPr>
-        <p:spPr>
-          <a:xfrm>
-            <a:off x="1143000" y="228600"/>
-            <a:ext cx="7848600" cy="685800"/>
-          </a:xfrm>
-        </p:spPr>
+        <p:spPr/>
         <p:txBody>
           <a:bodyPr>
             <a:noAutofit/>
           </a:bodyPr>
           <a:lstStyle/>
           <a:p>
-            <a:r>
-              <a:rPr lang="en-US" sz="2500" dirty="0" smtClean="0"/>
-              <a:t>Notable</a:t>
-            </a:r>
-            <a:r>
-              <a:rPr lang="en-US" sz="2500" baseline="0" dirty="0" smtClean="0"/>
-              <a:t> </a:t>
-            </a:r>
-            <a:r>
-              <a:rPr lang="en-US" sz="2500" baseline="0" dirty="0" err="1" smtClean="0"/>
-              <a:t>phonegap</a:t>
-            </a:r>
-            <a:r>
-              <a:rPr lang="en-US" sz="2500" baseline="0" dirty="0" smtClean="0"/>
-              <a:t> build features</a:t>
-            </a:r>
-            <a:endParaRPr lang="en-US" sz="2500" dirty="0"/>
+            <a:pPr marL="0" indent="0">
+              <a:buNone/>
+            </a:pPr>
+            <a:r>
+              <a:rPr lang="en-US" sz="4800" dirty="0" smtClean="0"/>
+              <a:t>~$700 early 2013</a:t>
+            </a:r>
+          </a:p>
+          <a:p>
+            <a:pPr marL="0" indent="0">
+              <a:buNone/>
+            </a:pPr>
+            <a:r>
+              <a:rPr lang="en-US" sz="4800" dirty="0" smtClean="0"/>
+              <a:t>$199 late 2013</a:t>
+            </a:r>
+          </a:p>
+          <a:p>
+            <a:pPr marL="0" indent="0">
+              <a:buNone/>
+            </a:pPr>
+            <a:r>
+              <a:rPr lang="en-US" sz="4800" dirty="0" smtClean="0"/>
+              <a:t>Free/open-source, April 2014 </a:t>
+            </a:r>
+            <a:endParaRPr lang="en-US" sz="4800" dirty="0"/>
+          </a:p>
+        </p:txBody>
+      </p:sp>
+      <p:sp>
+        <p:nvSpPr>
+          <p:cNvPr id="3" name="Title 2"/>
+          <p:cNvSpPr>
+            <a:spLocks noGrp="1"/>
+          </p:cNvSpPr>
+          <p:nvPr>
+            <p:ph type="title"/>
+          </p:nvPr>
+        </p:nvSpPr>
+        <p:spPr/>
+        <p:txBody>
+          <a:bodyPr/>
+          <a:lstStyle/>
+          <a:p>
+            <a:r>
+              <a:rPr lang="en-US" dirty="0" smtClean="0"/>
+              <a:t>Kendo </a:t>
+            </a:r>
+            <a:r>
+              <a:rPr lang="en-US" dirty="0" err="1" smtClean="0"/>
+              <a:t>ui</a:t>
+            </a:r>
+            <a:r>
+              <a:rPr lang="en-US" dirty="0" smtClean="0"/>
+              <a:t>: cost?</a:t>
+            </a:r>
+            <a:endParaRPr lang="en-US" dirty="0"/>
           </a:p>
         </p:txBody>
       </p:sp>
     </p:spTree>
     <p:extLst>
       <p:ext uri="{BB962C8B-B14F-4D97-AF65-F5344CB8AC3E}">
-        <p14:creationId xmlns:p14="http://schemas.microsoft.com/office/powerpoint/2010/main" val="2284147550"/>
+        <p14:creationId xmlns:p14="http://schemas.microsoft.com/office/powerpoint/2010/main" val="2761229133"/>
       </p:ext>
     </p:extLst>
   </p:cSld>
@@ -7828,6 +8850,1168 @@
       </p:grpSpPr>
       <p:sp>
         <p:nvSpPr>
+          <p:cNvPr id="3" name="Title 2"/>
+          <p:cNvSpPr>
+            <a:spLocks noGrp="1"/>
+          </p:cNvSpPr>
+          <p:nvPr>
+            <p:ph type="title"/>
+          </p:nvPr>
+        </p:nvSpPr>
+        <p:spPr/>
+        <p:txBody>
+          <a:bodyPr/>
+          <a:lstStyle/>
+          <a:p>
+            <a:r>
+              <a:rPr lang="en-US" dirty="0" smtClean="0"/>
+              <a:t>From web to native app</a:t>
+            </a:r>
+            <a:endParaRPr lang="en-US" dirty="0"/>
+          </a:p>
+        </p:txBody>
+      </p:sp>
+      <p:pic>
+        <p:nvPicPr>
+          <p:cNvPr id="5" name="Picture 2"/>
+          <p:cNvPicPr>
+            <a:picLocks noChangeAspect="1" noChangeArrowheads="1"/>
+          </p:cNvPicPr>
+          <p:nvPr/>
+        </p:nvPicPr>
+        <p:blipFill>
+          <a:blip r:embed="rId3">
+            <a:extLst>
+              <a:ext uri="{28A0092B-C50C-407E-A947-70E740481C1C}">
+                <a14:useLocalDpi xmlns:a14="http://schemas.microsoft.com/office/drawing/2010/main" val="0"/>
+              </a:ext>
+            </a:extLst>
+          </a:blip>
+          <a:srcRect/>
+          <a:stretch>
+            <a:fillRect/>
+          </a:stretch>
+        </p:blipFill>
+        <p:spPr bwMode="auto">
+          <a:xfrm>
+            <a:off x="3429000" y="1240971"/>
+            <a:ext cx="2615105" cy="5353274"/>
+          </a:xfrm>
+          <a:prstGeom prst="rect">
+            <a:avLst/>
+          </a:prstGeom>
+          <a:noFill/>
+          <a:ln>
+            <a:noFill/>
+          </a:ln>
+          <a:extLst>
+            <a:ext uri="{909E8E84-426E-40DD-AFC4-6F175D3DCCD1}">
+              <a14:hiddenFill xmlns:a14="http://schemas.microsoft.com/office/drawing/2010/main">
+                <a:solidFill>
+                  <a:schemeClr val="accent1"/>
+                </a:solidFill>
+              </a14:hiddenFill>
+            </a:ext>
+            <a:ext uri="{91240B29-F687-4F45-9708-019B960494DF}">
+              <a14:hiddenLine xmlns:a14="http://schemas.microsoft.com/office/drawing/2010/main" w="9525">
+                <a:solidFill>
+                  <a:schemeClr val="tx1"/>
+                </a:solidFill>
+                <a:miter lim="800000"/>
+                <a:headEnd/>
+                <a:tailEnd/>
+              </a14:hiddenLine>
+            </a:ext>
+          </a:extLst>
+        </p:spPr>
+      </p:pic>
+    </p:spTree>
+    <p:extLst>
+      <p:ext uri="{BB962C8B-B14F-4D97-AF65-F5344CB8AC3E}">
+        <p14:creationId xmlns:p14="http://schemas.microsoft.com/office/powerpoint/2010/main" val="2178363162"/>
+      </p:ext>
+    </p:extLst>
+  </p:cSld>
+  <p:clrMapOvr>
+    <a:masterClrMapping/>
+  </p:clrMapOvr>
+  <p:timing>
+    <p:tnLst>
+      <p:par>
+        <p:cTn id="1" dur="indefinite" restart="never" nodeType="tmRoot"/>
+      </p:par>
+    </p:tnLst>
+  </p:timing>
+</p:sld>
+</file>
+
+<file path=ppt/slides/slide23.xml><?xml version="1.0" encoding="utf-8"?>
+<p:sld xmlns:a="http://schemas.openxmlformats.org/drawingml/2006/main" xmlns:r="http://schemas.openxmlformats.org/officeDocument/2006/relationships" xmlns:p="http://schemas.openxmlformats.org/presentationml/2006/main">
+  <p:cSld>
+    <p:spTree>
+      <p:nvGrpSpPr>
+        <p:cNvPr id="1" name=""/>
+        <p:cNvGrpSpPr/>
+        <p:nvPr/>
+      </p:nvGrpSpPr>
+      <p:grpSpPr>
+        <a:xfrm>
+          <a:off x="0" y="0"/>
+          <a:ext cx="0" cy="0"/>
+          <a:chOff x="0" y="0"/>
+          <a:chExt cx="0" cy="0"/>
+        </a:xfrm>
+      </p:grpSpPr>
+      <p:sp>
+        <p:nvSpPr>
+          <p:cNvPr id="3" name="Title 2"/>
+          <p:cNvSpPr>
+            <a:spLocks noGrp="1"/>
+          </p:cNvSpPr>
+          <p:nvPr>
+            <p:ph type="title"/>
+          </p:nvPr>
+        </p:nvSpPr>
+        <p:spPr/>
+        <p:txBody>
+          <a:bodyPr>
+            <a:normAutofit/>
+          </a:bodyPr>
+          <a:lstStyle/>
+          <a:p>
+            <a:r>
+              <a:rPr lang="en-US" dirty="0" smtClean="0"/>
+              <a:t>From web to native app</a:t>
+            </a:r>
+            <a:endParaRPr lang="en-US" dirty="0"/>
+          </a:p>
+        </p:txBody>
+      </p:sp>
+      <p:sp>
+        <p:nvSpPr>
+          <p:cNvPr id="2" name="TextBox 1"/>
+          <p:cNvSpPr txBox="1"/>
+          <p:nvPr/>
+        </p:nvSpPr>
+        <p:spPr>
+          <a:xfrm>
+            <a:off x="609600" y="990600"/>
+            <a:ext cx="7772400" cy="5293757"/>
+          </a:xfrm>
+          <a:prstGeom prst="rect">
+            <a:avLst/>
+          </a:prstGeom>
+          <a:noFill/>
+        </p:spPr>
+        <p:txBody>
+          <a:bodyPr wrap="square" rtlCol="0">
+            <a:spAutoFit/>
+          </a:bodyPr>
+          <a:lstStyle/>
+          <a:p>
+            <a:r>
+              <a:rPr lang="en-US" sz="2600" dirty="0" err="1" smtClean="0">
+                <a:solidFill>
+                  <a:schemeClr val="bg1"/>
+                </a:solidFill>
+              </a:rPr>
+              <a:t>PhoneGap</a:t>
+            </a:r>
+            <a:endParaRPr lang="en-US" sz="2600" dirty="0" smtClean="0">
+              <a:solidFill>
+                <a:schemeClr val="bg1"/>
+              </a:solidFill>
+            </a:endParaRPr>
+          </a:p>
+          <a:p>
+            <a:pPr marL="285750" indent="-285750">
+              <a:buFontTx/>
+              <a:buChar char="-"/>
+            </a:pPr>
+            <a:r>
+              <a:rPr lang="en-US" sz="2600" dirty="0" smtClean="0">
+                <a:solidFill>
+                  <a:schemeClr val="bg1"/>
+                </a:solidFill>
+              </a:rPr>
+              <a:t>Implements native “wiring” for you</a:t>
+            </a:r>
+          </a:p>
+          <a:p>
+            <a:pPr marL="285750" indent="-285750">
+              <a:buFontTx/>
+              <a:buChar char="-"/>
+            </a:pPr>
+            <a:r>
+              <a:rPr lang="en-US" sz="2600" dirty="0" smtClean="0">
+                <a:solidFill>
+                  <a:schemeClr val="bg1"/>
+                </a:solidFill>
+              </a:rPr>
+              <a:t>Provides access to device features via JavaScript API’s</a:t>
+            </a:r>
+          </a:p>
+          <a:p>
+            <a:pPr marL="285750" indent="-285750">
+              <a:buFontTx/>
+              <a:buChar char="-"/>
+            </a:pPr>
+            <a:r>
+              <a:rPr lang="en-US" sz="2600" dirty="0">
+                <a:solidFill>
+                  <a:schemeClr val="bg1"/>
+                </a:solidFill>
+              </a:rPr>
+              <a:t> </a:t>
+            </a:r>
+            <a:r>
+              <a:rPr lang="en-US" sz="2600" dirty="0" smtClean="0">
+                <a:solidFill>
+                  <a:schemeClr val="bg1"/>
+                </a:solidFill>
+              </a:rPr>
+              <a:t>Individual Platform SDKs required</a:t>
+            </a:r>
+          </a:p>
+          <a:p>
+            <a:endParaRPr lang="en-US" sz="2600" dirty="0">
+              <a:solidFill>
+                <a:schemeClr val="bg1"/>
+              </a:solidFill>
+            </a:endParaRPr>
+          </a:p>
+          <a:p>
+            <a:endParaRPr lang="en-US" sz="2600" dirty="0" smtClean="0">
+              <a:solidFill>
+                <a:schemeClr val="bg1"/>
+              </a:solidFill>
+            </a:endParaRPr>
+          </a:p>
+          <a:p>
+            <a:r>
+              <a:rPr lang="en-US" sz="2600" dirty="0" err="1" smtClean="0">
+                <a:solidFill>
+                  <a:schemeClr val="bg1"/>
+                </a:solidFill>
+              </a:rPr>
+              <a:t>PhoneGap</a:t>
+            </a:r>
+            <a:r>
+              <a:rPr lang="en-US" sz="2600" dirty="0" smtClean="0">
+                <a:solidFill>
+                  <a:schemeClr val="bg1"/>
+                </a:solidFill>
+              </a:rPr>
+              <a:t> Build</a:t>
+            </a:r>
+          </a:p>
+          <a:p>
+            <a:pPr marL="285750" indent="-285750">
+              <a:buFontTx/>
+              <a:buChar char="-"/>
+            </a:pPr>
+            <a:r>
+              <a:rPr lang="en-US" sz="2600" dirty="0" smtClean="0">
+                <a:solidFill>
+                  <a:schemeClr val="bg1"/>
+                </a:solidFill>
+              </a:rPr>
+              <a:t>cloud </a:t>
+            </a:r>
+            <a:r>
+              <a:rPr lang="en-US" sz="2600" dirty="0">
+                <a:solidFill>
+                  <a:schemeClr val="bg1"/>
+                </a:solidFill>
+              </a:rPr>
+              <a:t>service </a:t>
+            </a:r>
+            <a:r>
+              <a:rPr lang="en-US" sz="2600" dirty="0" smtClean="0">
+                <a:solidFill>
+                  <a:schemeClr val="bg1"/>
+                </a:solidFill>
+              </a:rPr>
+              <a:t>that creates native app &amp; injects </a:t>
+            </a:r>
+            <a:r>
+              <a:rPr lang="en-US" sz="2600" dirty="0" err="1" smtClean="0">
+                <a:solidFill>
+                  <a:schemeClr val="bg1"/>
+                </a:solidFill>
+              </a:rPr>
+              <a:t>PhoneGap</a:t>
+            </a:r>
+            <a:r>
+              <a:rPr lang="en-US" sz="2600" dirty="0" smtClean="0">
+                <a:solidFill>
+                  <a:schemeClr val="bg1"/>
+                </a:solidFill>
+              </a:rPr>
+              <a:t> into it</a:t>
+            </a:r>
+          </a:p>
+          <a:p>
+            <a:pPr marL="285750" indent="-285750">
+              <a:buFontTx/>
+              <a:buChar char="-"/>
+            </a:pPr>
+            <a:r>
+              <a:rPr lang="en-US" sz="2600" dirty="0" smtClean="0">
+                <a:solidFill>
+                  <a:schemeClr val="bg1"/>
+                </a:solidFill>
+              </a:rPr>
+              <a:t>No SDKs</a:t>
+            </a:r>
+            <a:r>
+              <a:rPr lang="en-US" sz="2600" dirty="0">
+                <a:solidFill>
+                  <a:schemeClr val="bg1"/>
+                </a:solidFill>
+              </a:rPr>
+              <a:t>, </a:t>
+            </a:r>
+            <a:r>
+              <a:rPr lang="en-US" sz="2600" dirty="0" smtClean="0">
+                <a:solidFill>
+                  <a:schemeClr val="bg1"/>
+                </a:solidFill>
+              </a:rPr>
+              <a:t>compilers, or hardware (iOS requires a Mac)</a:t>
+            </a:r>
+          </a:p>
+          <a:p>
+            <a:pPr marL="285750" indent="-285750">
+              <a:buFontTx/>
+              <a:buChar char="-"/>
+            </a:pPr>
+            <a:r>
+              <a:rPr lang="en-US" sz="2600" dirty="0" smtClean="0">
+                <a:solidFill>
+                  <a:schemeClr val="bg1"/>
+                </a:solidFill>
+              </a:rPr>
+              <a:t>1 private app free!</a:t>
+            </a:r>
+            <a:endParaRPr lang="en-US" sz="2600" dirty="0">
+              <a:solidFill>
+                <a:schemeClr val="bg1"/>
+              </a:solidFill>
+            </a:endParaRPr>
+          </a:p>
+        </p:txBody>
+      </p:sp>
+    </p:spTree>
+    <p:extLst>
+      <p:ext uri="{BB962C8B-B14F-4D97-AF65-F5344CB8AC3E}">
+        <p14:creationId xmlns:p14="http://schemas.microsoft.com/office/powerpoint/2010/main" val="2683195493"/>
+      </p:ext>
+    </p:extLst>
+  </p:cSld>
+  <p:clrMapOvr>
+    <a:masterClrMapping/>
+  </p:clrMapOvr>
+  <p:timing>
+    <p:tnLst>
+      <p:par>
+        <p:cTn id="1" dur="indefinite" restart="never" nodeType="tmRoot"/>
+      </p:par>
+    </p:tnLst>
+  </p:timing>
+</p:sld>
+</file>
+
+<file path=ppt/slides/slide24.xml><?xml version="1.0" encoding="utf-8"?>
+<p:sld xmlns:a="http://schemas.openxmlformats.org/drawingml/2006/main" xmlns:r="http://schemas.openxmlformats.org/officeDocument/2006/relationships" xmlns:p="http://schemas.openxmlformats.org/presentationml/2006/main">
+  <p:cSld>
+    <p:spTree>
+      <p:nvGrpSpPr>
+        <p:cNvPr id="1" name=""/>
+        <p:cNvGrpSpPr/>
+        <p:nvPr/>
+      </p:nvGrpSpPr>
+      <p:grpSpPr>
+        <a:xfrm>
+          <a:off x="0" y="0"/>
+          <a:ext cx="0" cy="0"/>
+          <a:chOff x="0" y="0"/>
+          <a:chExt cx="0" cy="0"/>
+        </a:xfrm>
+      </p:grpSpPr>
+      <p:sp>
+        <p:nvSpPr>
+          <p:cNvPr id="2" name="Content Placeholder 1"/>
+          <p:cNvSpPr>
+            <a:spLocks noGrp="1"/>
+          </p:cNvSpPr>
+          <p:nvPr>
+            <p:ph sz="quarter" idx="13"/>
+          </p:nvPr>
+        </p:nvSpPr>
+        <p:spPr>
+          <a:xfrm>
+            <a:off x="838200" y="1219200"/>
+            <a:ext cx="6172200" cy="4572000"/>
+          </a:xfrm>
+        </p:spPr>
+        <p:txBody>
+          <a:bodyPr>
+            <a:normAutofit fontScale="77500" lnSpcReduction="20000"/>
+          </a:bodyPr>
+          <a:lstStyle/>
+          <a:p>
+            <a:r>
+              <a:rPr lang="en-US" dirty="0" smtClean="0"/>
+              <a:t>Plugins</a:t>
+            </a:r>
+          </a:p>
+          <a:p>
+            <a:pPr lvl="1"/>
+            <a:r>
+              <a:rPr lang="en-US" dirty="0" smtClean="0"/>
+              <a:t>Fill in missing native functionality:</a:t>
+            </a:r>
+          </a:p>
+          <a:p>
+            <a:pPr lvl="2"/>
+            <a:r>
+              <a:rPr lang="en-US" dirty="0" smtClean="0"/>
+              <a:t>Camera interaction</a:t>
+            </a:r>
+          </a:p>
+          <a:p>
+            <a:pPr lvl="2"/>
+            <a:r>
+              <a:rPr lang="en-US" dirty="0" smtClean="0"/>
+              <a:t>In-app Browser</a:t>
+            </a:r>
+          </a:p>
+          <a:p>
+            <a:pPr lvl="2"/>
+            <a:r>
+              <a:rPr lang="en-US" dirty="0" smtClean="0"/>
+              <a:t>Google Analytics</a:t>
+            </a:r>
+          </a:p>
+          <a:p>
+            <a:pPr lvl="2"/>
+            <a:endParaRPr lang="en-US" dirty="0" smtClean="0"/>
+          </a:p>
+          <a:p>
+            <a:r>
+              <a:rPr lang="en-US" dirty="0" smtClean="0"/>
+              <a:t>Hydration</a:t>
+            </a:r>
+          </a:p>
+          <a:p>
+            <a:pPr lvl="1"/>
+            <a:r>
+              <a:rPr lang="en-US" dirty="0" smtClean="0"/>
+              <a:t>Automatically deploy new app versions to devices</a:t>
+            </a:r>
+          </a:p>
+          <a:p>
+            <a:pPr lvl="1"/>
+            <a:r>
+              <a:rPr lang="en-US" dirty="0" smtClean="0"/>
+              <a:t>Useful individually or with a team</a:t>
+            </a:r>
+          </a:p>
+          <a:p>
+            <a:pPr lvl="1"/>
+            <a:endParaRPr lang="en-US" dirty="0" smtClean="0"/>
+          </a:p>
+          <a:p>
+            <a:r>
+              <a:rPr lang="en-US" dirty="0" smtClean="0"/>
+              <a:t>Remote debugging</a:t>
+            </a:r>
+          </a:p>
+          <a:p>
+            <a:pPr lvl="1"/>
+            <a:r>
+              <a:rPr lang="en-US" dirty="0" smtClean="0"/>
+              <a:t>Review app code, storage, etc. all in real-time</a:t>
+            </a:r>
+          </a:p>
+          <a:p>
+            <a:pPr lvl="1"/>
+            <a:r>
+              <a:rPr lang="en-US" dirty="0" smtClean="0"/>
+              <a:t>Debug plugin behavior</a:t>
+            </a:r>
+          </a:p>
+        </p:txBody>
+      </p:sp>
+      <p:sp>
+        <p:nvSpPr>
+          <p:cNvPr id="3" name="Title 2"/>
+          <p:cNvSpPr>
+            <a:spLocks noGrp="1"/>
+          </p:cNvSpPr>
+          <p:nvPr>
+            <p:ph type="title"/>
+          </p:nvPr>
+        </p:nvSpPr>
+        <p:spPr>
+          <a:xfrm>
+            <a:off x="914400" y="228600"/>
+            <a:ext cx="7848600" cy="685800"/>
+          </a:xfrm>
+        </p:spPr>
+        <p:txBody>
+          <a:bodyPr>
+            <a:noAutofit/>
+          </a:bodyPr>
+          <a:lstStyle/>
+          <a:p>
+            <a:r>
+              <a:rPr lang="en-US" sz="2500" baseline="0" dirty="0" err="1" smtClean="0"/>
+              <a:t>phonegap</a:t>
+            </a:r>
+            <a:r>
+              <a:rPr lang="en-US" sz="2500" baseline="0" dirty="0" smtClean="0"/>
+              <a:t> build: </a:t>
+            </a:r>
+            <a:r>
+              <a:rPr lang="en-US" sz="2500" baseline="0" dirty="0" smtClean="0"/>
+              <a:t>features</a:t>
+            </a:r>
+            <a:endParaRPr lang="en-US" sz="2500" dirty="0"/>
+          </a:p>
+        </p:txBody>
+      </p:sp>
+      <p:sp>
+        <p:nvSpPr>
+          <p:cNvPr id="4" name="TextBox 3"/>
+          <p:cNvSpPr txBox="1"/>
+          <p:nvPr/>
+        </p:nvSpPr>
+        <p:spPr>
+          <a:xfrm>
+            <a:off x="8305800" y="6324600"/>
+            <a:ext cx="1143000" cy="369332"/>
+          </a:xfrm>
+          <a:prstGeom prst="rect">
+            <a:avLst/>
+          </a:prstGeom>
+          <a:noFill/>
+        </p:spPr>
+        <p:txBody>
+          <a:bodyPr wrap="square" rtlCol="0">
+            <a:spAutoFit/>
+          </a:bodyPr>
+          <a:lstStyle/>
+          <a:p>
+            <a:r>
+              <a:rPr lang="en-US" dirty="0" smtClean="0"/>
+              <a:t>demo</a:t>
+            </a:r>
+            <a:endParaRPr lang="en-US" dirty="0"/>
+          </a:p>
+        </p:txBody>
+      </p:sp>
+    </p:spTree>
+    <p:extLst>
+      <p:ext uri="{BB962C8B-B14F-4D97-AF65-F5344CB8AC3E}">
+        <p14:creationId xmlns:p14="http://schemas.microsoft.com/office/powerpoint/2010/main" val="2284147550"/>
+      </p:ext>
+    </p:extLst>
+  </p:cSld>
+  <p:clrMapOvr>
+    <a:masterClrMapping/>
+  </p:clrMapOvr>
+  <p:timing>
+    <p:tnLst>
+      <p:par>
+        <p:cTn id="1" dur="indefinite" restart="never" nodeType="tmRoot"/>
+      </p:par>
+    </p:tnLst>
+  </p:timing>
+</p:sld>
+</file>
+
+<file path=ppt/slides/slide25.xml><?xml version="1.0" encoding="utf-8"?>
+<p:sld xmlns:a="http://schemas.openxmlformats.org/drawingml/2006/main" xmlns:r="http://schemas.openxmlformats.org/officeDocument/2006/relationships" xmlns:p="http://schemas.openxmlformats.org/presentationml/2006/main">
+  <p:cSld>
+    <p:spTree>
+      <p:nvGrpSpPr>
+        <p:cNvPr id="1" name=""/>
+        <p:cNvGrpSpPr/>
+        <p:nvPr/>
+      </p:nvGrpSpPr>
+      <p:grpSpPr>
+        <a:xfrm>
+          <a:off x="0" y="0"/>
+          <a:ext cx="0" cy="0"/>
+          <a:chOff x="0" y="0"/>
+          <a:chExt cx="0" cy="0"/>
+        </a:xfrm>
+      </p:grpSpPr>
+      <p:sp>
+        <p:nvSpPr>
+          <p:cNvPr id="2" name="Content Placeholder 1"/>
+          <p:cNvSpPr>
+            <a:spLocks noGrp="1"/>
+          </p:cNvSpPr>
+          <p:nvPr>
+            <p:ph sz="quarter" idx="13"/>
+          </p:nvPr>
+        </p:nvSpPr>
+        <p:spPr>
+          <a:xfrm>
+            <a:off x="533400" y="914400"/>
+            <a:ext cx="7924800" cy="762000"/>
+          </a:xfrm>
+        </p:spPr>
+        <p:txBody>
+          <a:bodyPr>
+            <a:normAutofit fontScale="85000" lnSpcReduction="20000"/>
+          </a:bodyPr>
+          <a:lstStyle/>
+          <a:p>
+            <a:r>
+              <a:rPr lang="en-US" dirty="0" smtClean="0"/>
+              <a:t>Easily build multiple versions of app from same codebase:</a:t>
+            </a:r>
+            <a:endParaRPr lang="en-US" dirty="0"/>
+          </a:p>
+        </p:txBody>
+      </p:sp>
+      <p:sp>
+        <p:nvSpPr>
+          <p:cNvPr id="3" name="Title 2"/>
+          <p:cNvSpPr>
+            <a:spLocks noGrp="1"/>
+          </p:cNvSpPr>
+          <p:nvPr>
+            <p:ph type="title"/>
+          </p:nvPr>
+        </p:nvSpPr>
+        <p:spPr>
+          <a:xfrm>
+            <a:off x="1219200" y="152400"/>
+            <a:ext cx="8077200" cy="533400"/>
+          </a:xfrm>
+        </p:spPr>
+        <p:txBody>
+          <a:bodyPr>
+            <a:noAutofit/>
+          </a:bodyPr>
+          <a:lstStyle/>
+          <a:p>
+            <a:r>
+              <a:rPr lang="en-US" sz="2500" dirty="0" smtClean="0"/>
+              <a:t>NOTABLE PHONEGAP BUILD FEATURES</a:t>
+            </a:r>
+            <a:endParaRPr lang="en-US" sz="2500" dirty="0"/>
+          </a:p>
+        </p:txBody>
+      </p:sp>
+      <p:pic>
+        <p:nvPicPr>
+          <p:cNvPr id="3075" name="Picture 3"/>
+          <p:cNvPicPr>
+            <a:picLocks noChangeAspect="1" noChangeArrowheads="1"/>
+          </p:cNvPicPr>
+          <p:nvPr/>
+        </p:nvPicPr>
+        <p:blipFill>
+          <a:blip r:embed="rId3">
+            <a:extLst>
+              <a:ext uri="{28A0092B-C50C-407E-A947-70E740481C1C}">
+                <a14:useLocalDpi xmlns:a14="http://schemas.microsoft.com/office/drawing/2010/main" val="0"/>
+              </a:ext>
+            </a:extLst>
+          </a:blip>
+          <a:srcRect/>
+          <a:stretch>
+            <a:fillRect/>
+          </a:stretch>
+        </p:blipFill>
+        <p:spPr bwMode="auto">
+          <a:xfrm>
+            <a:off x="242888" y="881063"/>
+            <a:ext cx="8658225" cy="5095875"/>
+          </a:xfrm>
+          <a:prstGeom prst="rect">
+            <a:avLst/>
+          </a:prstGeom>
+          <a:noFill/>
+          <a:ln>
+            <a:noFill/>
+          </a:ln>
+          <a:extLst>
+            <a:ext uri="{909E8E84-426E-40DD-AFC4-6F175D3DCCD1}">
+              <a14:hiddenFill xmlns:a14="http://schemas.microsoft.com/office/drawing/2010/main">
+                <a:solidFill>
+                  <a:schemeClr val="accent1"/>
+                </a:solidFill>
+              </a14:hiddenFill>
+            </a:ext>
+            <a:ext uri="{91240B29-F687-4F45-9708-019B960494DF}">
+              <a14:hiddenLine xmlns:a14="http://schemas.microsoft.com/office/drawing/2010/main" w="9525">
+                <a:solidFill>
+                  <a:schemeClr val="tx1"/>
+                </a:solidFill>
+                <a:miter lim="800000"/>
+                <a:headEnd/>
+                <a:tailEnd/>
+              </a14:hiddenLine>
+            </a:ext>
+          </a:extLst>
+        </p:spPr>
+      </p:pic>
+    </p:spTree>
+    <p:extLst>
+      <p:ext uri="{BB962C8B-B14F-4D97-AF65-F5344CB8AC3E}">
+        <p14:creationId xmlns:p14="http://schemas.microsoft.com/office/powerpoint/2010/main" val="2592480722"/>
+      </p:ext>
+    </p:extLst>
+  </p:cSld>
+  <p:clrMapOvr>
+    <a:masterClrMapping/>
+  </p:clrMapOvr>
+  <p:timing>
+    <p:tnLst>
+      <p:par>
+        <p:cTn id="1" dur="indefinite" restart="never" nodeType="tmRoot"/>
+      </p:par>
+    </p:tnLst>
+  </p:timing>
+</p:sld>
+</file>
+
+<file path=ppt/slides/slide26.xml><?xml version="1.0" encoding="utf-8"?>
+<p:sld xmlns:a="http://schemas.openxmlformats.org/drawingml/2006/main" xmlns:r="http://schemas.openxmlformats.org/officeDocument/2006/relationships" xmlns:p="http://schemas.openxmlformats.org/presentationml/2006/main">
+  <p:cSld>
+    <p:spTree>
+      <p:nvGrpSpPr>
+        <p:cNvPr id="1" name=""/>
+        <p:cNvGrpSpPr/>
+        <p:nvPr/>
+      </p:nvGrpSpPr>
+      <p:grpSpPr>
+        <a:xfrm>
+          <a:off x="0" y="0"/>
+          <a:ext cx="0" cy="0"/>
+          <a:chOff x="0" y="0"/>
+          <a:chExt cx="0" cy="0"/>
+        </a:xfrm>
+      </p:grpSpPr>
+      <p:sp>
+        <p:nvSpPr>
+          <p:cNvPr id="2" name="Content Placeholder 1"/>
+          <p:cNvSpPr>
+            <a:spLocks noGrp="1"/>
+          </p:cNvSpPr>
+          <p:nvPr>
+            <p:ph sz="quarter" idx="13"/>
+          </p:nvPr>
+        </p:nvSpPr>
+        <p:spPr>
+          <a:xfrm>
+            <a:off x="685800" y="1295400"/>
+            <a:ext cx="4953000" cy="5257800"/>
+          </a:xfrm>
+        </p:spPr>
+        <p:txBody>
+          <a:bodyPr>
+            <a:normAutofit/>
+          </a:bodyPr>
+          <a:lstStyle/>
+          <a:p>
+            <a:pPr marL="0" indent="0">
+              <a:buNone/>
+            </a:pPr>
+            <a:r>
+              <a:rPr lang="en-US" dirty="0" smtClean="0"/>
+              <a:t>Web</a:t>
+            </a:r>
+            <a:r>
+              <a:rPr lang="en-US" i="0" dirty="0" smtClean="0"/>
+              <a:t>:</a:t>
+            </a:r>
+          </a:p>
+          <a:p>
+            <a:pPr lvl="1"/>
+            <a:r>
+              <a:rPr lang="en-US" i="0" dirty="0"/>
+              <a:t>All app logic (JavaScript</a:t>
+            </a:r>
+            <a:r>
+              <a:rPr lang="en-US" i="0" dirty="0" smtClean="0"/>
+              <a:t>)</a:t>
+            </a:r>
+          </a:p>
+          <a:p>
+            <a:pPr lvl="1"/>
+            <a:r>
+              <a:rPr lang="en-US" i="0" dirty="0" smtClean="0"/>
+              <a:t>Layout (HTML)</a:t>
+            </a:r>
+          </a:p>
+          <a:p>
+            <a:pPr lvl="1"/>
+            <a:r>
+              <a:rPr lang="en-US" i="0" dirty="0" smtClean="0"/>
+              <a:t>Styling (CSS) via </a:t>
+            </a:r>
+            <a:r>
+              <a:rPr lang="en-US" b="1" i="0" dirty="0" smtClean="0"/>
+              <a:t>Kendo </a:t>
+            </a:r>
+            <a:r>
+              <a:rPr lang="en-US" b="1" i="0" dirty="0" smtClean="0"/>
+              <a:t>UI Mobile</a:t>
+            </a:r>
+            <a:endParaRPr lang="en-US" b="1" i="0" dirty="0" smtClean="0"/>
+          </a:p>
+          <a:p>
+            <a:pPr marL="0" indent="0">
+              <a:buNone/>
+            </a:pPr>
+            <a:endParaRPr lang="en-US" dirty="0" smtClean="0"/>
+          </a:p>
+          <a:p>
+            <a:pPr marL="0" indent="0">
+              <a:buNone/>
+            </a:pPr>
+            <a:r>
+              <a:rPr lang="en-US" dirty="0" smtClean="0"/>
+              <a:t>Native &amp; Native Shell</a:t>
+            </a:r>
+            <a:r>
+              <a:rPr lang="en-US" i="0" dirty="0" smtClean="0"/>
+              <a:t>:</a:t>
+            </a:r>
+          </a:p>
+          <a:p>
+            <a:pPr lvl="1"/>
+            <a:r>
+              <a:rPr lang="en-US" i="0" dirty="0"/>
+              <a:t>Compiled app via </a:t>
+            </a:r>
+            <a:r>
+              <a:rPr lang="en-US" b="1" i="0" dirty="0"/>
+              <a:t>PhoneGap </a:t>
+            </a:r>
+            <a:r>
+              <a:rPr lang="en-US" b="1" i="0" dirty="0" smtClean="0"/>
+              <a:t>Build</a:t>
+            </a:r>
+            <a:endParaRPr lang="en-US" i="0" dirty="0" smtClean="0"/>
+          </a:p>
+          <a:p>
+            <a:pPr lvl="1"/>
+            <a:r>
+              <a:rPr lang="en-US" i="0" dirty="0" smtClean="0"/>
+              <a:t>Device APIs: </a:t>
+            </a:r>
+            <a:r>
+              <a:rPr lang="en-US" b="1" i="0" dirty="0" smtClean="0"/>
+              <a:t>PhoneGap</a:t>
+            </a:r>
+          </a:p>
+        </p:txBody>
+      </p:sp>
+      <p:sp>
+        <p:nvSpPr>
+          <p:cNvPr id="3" name="Title 2"/>
+          <p:cNvSpPr>
+            <a:spLocks noGrp="1"/>
+          </p:cNvSpPr>
+          <p:nvPr>
+            <p:ph type="title"/>
+          </p:nvPr>
+        </p:nvSpPr>
+        <p:spPr>
+          <a:xfrm>
+            <a:off x="1828800" y="304800"/>
+            <a:ext cx="5867400" cy="838200"/>
+          </a:xfrm>
+        </p:spPr>
+        <p:txBody>
+          <a:bodyPr>
+            <a:normAutofit/>
+          </a:bodyPr>
+          <a:lstStyle/>
+          <a:p>
+            <a:r>
+              <a:rPr lang="en-US" dirty="0" smtClean="0"/>
+              <a:t>Creating a Hybrid app: </a:t>
+            </a:r>
+            <a:r>
+              <a:rPr lang="en-US" dirty="0" smtClean="0"/>
+              <a:t>recap</a:t>
+            </a:r>
+            <a:endParaRPr lang="en-US" dirty="0"/>
+          </a:p>
+        </p:txBody>
+      </p:sp>
+      <p:pic>
+        <p:nvPicPr>
+          <p:cNvPr id="6146" name="Picture 2"/>
+          <p:cNvPicPr>
+            <a:picLocks noChangeAspect="1" noChangeArrowheads="1"/>
+          </p:cNvPicPr>
+          <p:nvPr/>
+        </p:nvPicPr>
+        <p:blipFill>
+          <a:blip r:embed="rId3">
+            <a:extLst>
+              <a:ext uri="{28A0092B-C50C-407E-A947-70E740481C1C}">
+                <a14:useLocalDpi xmlns:a14="http://schemas.microsoft.com/office/drawing/2010/main" val="0"/>
+              </a:ext>
+            </a:extLst>
+          </a:blip>
+          <a:srcRect/>
+          <a:stretch>
+            <a:fillRect/>
+          </a:stretch>
+        </p:blipFill>
+        <p:spPr bwMode="auto">
+          <a:xfrm>
+            <a:off x="5901350" y="1676400"/>
+            <a:ext cx="2000250" cy="4094629"/>
+          </a:xfrm>
+          <a:prstGeom prst="rect">
+            <a:avLst/>
+          </a:prstGeom>
+          <a:noFill/>
+          <a:ln>
+            <a:noFill/>
+          </a:ln>
+          <a:extLst>
+            <a:ext uri="{909E8E84-426E-40DD-AFC4-6F175D3DCCD1}">
+              <a14:hiddenFill xmlns:a14="http://schemas.microsoft.com/office/drawing/2010/main">
+                <a:solidFill>
+                  <a:schemeClr val="accent1"/>
+                </a:solidFill>
+              </a14:hiddenFill>
+            </a:ext>
+            <a:ext uri="{91240B29-F687-4F45-9708-019B960494DF}">
+              <a14:hiddenLine xmlns:a14="http://schemas.microsoft.com/office/drawing/2010/main" w="9525">
+                <a:solidFill>
+                  <a:schemeClr val="tx1"/>
+                </a:solidFill>
+                <a:miter lim="800000"/>
+                <a:headEnd/>
+                <a:tailEnd/>
+              </a14:hiddenLine>
+            </a:ext>
+          </a:extLst>
+        </p:spPr>
+      </p:pic>
+    </p:spTree>
+    <p:extLst>
+      <p:ext uri="{BB962C8B-B14F-4D97-AF65-F5344CB8AC3E}">
+        <p14:creationId xmlns:p14="http://schemas.microsoft.com/office/powerpoint/2010/main" val="2446527947"/>
+      </p:ext>
+    </p:extLst>
+  </p:cSld>
+  <p:clrMapOvr>
+    <a:masterClrMapping/>
+  </p:clrMapOvr>
+  <p:timing>
+    <p:tnLst>
+      <p:par>
+        <p:cTn id="1" dur="indefinite" restart="never" nodeType="tmRoot"/>
+      </p:par>
+    </p:tnLst>
+  </p:timing>
+</p:sld>
+</file>
+
+<file path=ppt/slides/slide27.xml><?xml version="1.0" encoding="utf-8"?>
+<p:sld xmlns:a="http://schemas.openxmlformats.org/drawingml/2006/main" xmlns:r="http://schemas.openxmlformats.org/officeDocument/2006/relationships" xmlns:p="http://schemas.openxmlformats.org/presentationml/2006/main">
+  <p:cSld>
+    <p:spTree>
+      <p:nvGrpSpPr>
+        <p:cNvPr id="1" name=""/>
+        <p:cNvGrpSpPr/>
+        <p:nvPr/>
+      </p:nvGrpSpPr>
+      <p:grpSpPr>
+        <a:xfrm>
+          <a:off x="0" y="0"/>
+          <a:ext cx="0" cy="0"/>
+          <a:chOff x="0" y="0"/>
+          <a:chExt cx="0" cy="0"/>
+        </a:xfrm>
+      </p:grpSpPr>
+      <p:sp>
+        <p:nvSpPr>
+          <p:cNvPr id="2" name="Content Placeholder 1"/>
+          <p:cNvSpPr>
+            <a:spLocks noGrp="1"/>
+          </p:cNvSpPr>
+          <p:nvPr>
+            <p:ph sz="quarter" idx="13"/>
+          </p:nvPr>
+        </p:nvSpPr>
+        <p:spPr>
+          <a:xfrm>
+            <a:off x="685800" y="990600"/>
+            <a:ext cx="8382000" cy="5562600"/>
+          </a:xfrm>
+        </p:spPr>
+        <p:txBody>
+          <a:bodyPr>
+            <a:normAutofit fontScale="85000" lnSpcReduction="10000"/>
+          </a:bodyPr>
+          <a:lstStyle/>
+          <a:p>
+            <a:r>
+              <a:rPr lang="en-US" i="0" dirty="0"/>
+              <a:t>Hardware: natural improvements over time; incredibly powerful phones now (TODO graph?)</a:t>
+            </a:r>
+          </a:p>
+          <a:p>
+            <a:r>
+              <a:rPr lang="en-US" i="0" dirty="0"/>
+              <a:t>Software: apps run in </a:t>
+            </a:r>
+            <a:r>
+              <a:rPr lang="en-US" i="0" dirty="0" err="1"/>
+              <a:t>WebViews</a:t>
+            </a:r>
+            <a:endParaRPr lang="en-US" i="0" dirty="0"/>
+          </a:p>
+          <a:p>
+            <a:r>
+              <a:rPr lang="en-US" i="0" dirty="0"/>
+              <a:t>    - </a:t>
+            </a:r>
+            <a:r>
+              <a:rPr lang="en-US" i="0" dirty="0">
+                <a:hlinkClick r:id="rId2"/>
+              </a:rPr>
+              <a:t>Apple</a:t>
+            </a:r>
+            <a:r>
+              <a:rPr lang="en-US" i="0" dirty="0"/>
+              <a:t>: big improvements between iOS 7 and 8 </a:t>
+            </a:r>
+            <a:r>
+              <a:rPr lang="en-US" i="0" dirty="0" err="1"/>
+              <a:t>Javascript</a:t>
+            </a:r>
+            <a:r>
+              <a:rPr lang="en-US" i="0" dirty="0"/>
+              <a:t> performance, 4.5x faster with new </a:t>
+            </a:r>
+            <a:r>
+              <a:rPr lang="en-US" i="0" dirty="0" err="1"/>
+              <a:t>WebView</a:t>
+            </a:r>
+            <a:r>
+              <a:rPr lang="en-US" i="0" dirty="0"/>
+              <a:t>; </a:t>
+            </a:r>
+            <a:r>
+              <a:rPr lang="en-US" i="0" dirty="0" err="1"/>
+              <a:t>webGL</a:t>
+            </a:r>
+            <a:r>
+              <a:rPr lang="en-US" i="0" dirty="0"/>
+              <a:t>; </a:t>
+            </a:r>
+          </a:p>
+          <a:p>
+            <a:r>
+              <a:rPr lang="en-US" i="0" dirty="0"/>
+              <a:t>    - Android: v4.4 has new </a:t>
+            </a:r>
+            <a:r>
+              <a:rPr lang="en-US" i="0" dirty="0" err="1"/>
+              <a:t>WebView</a:t>
+            </a:r>
+            <a:r>
+              <a:rPr lang="en-US" i="0" dirty="0"/>
+              <a:t> version based on Chromium</a:t>
+            </a:r>
+          </a:p>
+          <a:p>
+            <a:r>
+              <a:rPr lang="en-US" i="0" dirty="0"/>
+              <a:t>May never be the exact same as native - consider what is "good enough". can you really measure milliseconds personally?</a:t>
+            </a:r>
+          </a:p>
+          <a:p>
+            <a:r>
+              <a:rPr lang="en-US" i="0" dirty="0"/>
+              <a:t>TODO: recommendations for types of apps: business, consumer, utilities, games (move to key takeaways?)</a:t>
+            </a:r>
+          </a:p>
+          <a:p>
+            <a:endParaRPr lang="en-US" dirty="0"/>
+          </a:p>
+        </p:txBody>
+      </p:sp>
+      <p:sp>
+        <p:nvSpPr>
+          <p:cNvPr id="3" name="Title 2"/>
+          <p:cNvSpPr>
+            <a:spLocks noGrp="1"/>
+          </p:cNvSpPr>
+          <p:nvPr>
+            <p:ph type="title"/>
+          </p:nvPr>
+        </p:nvSpPr>
+        <p:spPr/>
+        <p:txBody>
+          <a:bodyPr/>
+          <a:lstStyle/>
+          <a:p>
+            <a:r>
+              <a:rPr lang="en-US" dirty="0" smtClean="0"/>
+              <a:t>Hybrid app performance</a:t>
+            </a:r>
+            <a:endParaRPr lang="en-US" dirty="0"/>
+          </a:p>
+        </p:txBody>
+      </p:sp>
+    </p:spTree>
+    <p:extLst>
+      <p:ext uri="{BB962C8B-B14F-4D97-AF65-F5344CB8AC3E}">
+        <p14:creationId xmlns:p14="http://schemas.microsoft.com/office/powerpoint/2010/main" val="2219428483"/>
+      </p:ext>
+    </p:extLst>
+  </p:cSld>
+  <p:clrMapOvr>
+    <a:masterClrMapping/>
+  </p:clrMapOvr>
+  <p:timing>
+    <p:tnLst>
+      <p:par>
+        <p:cTn id="1" dur="indefinite" restart="never" nodeType="tmRoot"/>
+      </p:par>
+    </p:tnLst>
+  </p:timing>
+</p:sld>
+</file>
+
+<file path=ppt/slides/slide28.xml><?xml version="1.0" encoding="utf-8"?>
+<p:sld xmlns:a="http://schemas.openxmlformats.org/drawingml/2006/main" xmlns:r="http://schemas.openxmlformats.org/officeDocument/2006/relationships" xmlns:p="http://schemas.openxmlformats.org/presentationml/2006/main">
+  <p:cSld>
+    <p:spTree>
+      <p:nvGrpSpPr>
+        <p:cNvPr id="1" name=""/>
+        <p:cNvGrpSpPr/>
+        <p:nvPr/>
+      </p:nvGrpSpPr>
+      <p:grpSpPr>
+        <a:xfrm>
+          <a:off x="0" y="0"/>
+          <a:ext cx="0" cy="0"/>
+          <a:chOff x="0" y="0"/>
+          <a:chExt cx="0" cy="0"/>
+        </a:xfrm>
+      </p:grpSpPr>
+      <p:sp>
+        <p:nvSpPr>
           <p:cNvPr id="2" name="Content Placeholder 1"/>
           <p:cNvSpPr>
             <a:spLocks noGrp="1"/>
@@ -7983,7 +10167,7 @@
 </p:sld>
 </file>
 
-<file path=ppt/slides/slide23.xml><?xml version="1.0" encoding="utf-8"?>
+<file path=ppt/slides/slide29.xml><?xml version="1.0" encoding="utf-8"?>
 <p:sld xmlns:a="http://schemas.openxmlformats.org/drawingml/2006/main" xmlns:r="http://schemas.openxmlformats.org/officeDocument/2006/relationships" xmlns:p="http://schemas.openxmlformats.org/presentationml/2006/main">
   <p:cSld>
     <p:spTree>
@@ -8161,7 +10345,7 @@
             <a:pPr algn="ctr"/>
             <a:r>
               <a:rPr lang="en-US" sz="2500" dirty="0" smtClean="0"/>
-              <a:t>Idea for mobile app emerges…</a:t>
+              <a:t>Journey to mobile app</a:t>
             </a:r>
             <a:endParaRPr lang="en-US" sz="2500" dirty="0"/>
           </a:p>
@@ -8211,21 +10395,8 @@
                   <a:schemeClr val="bg1"/>
                 </a:solidFill>
               </a:rPr>
-              <a:t> user                           Weight Watchers member                         </a:t>
-            </a:r>
-            <a:r>
-              <a:rPr lang="en-US" dirty="0" smtClean="0">
-                <a:solidFill>
-                  <a:schemeClr val="bg1"/>
-                </a:solidFill>
-              </a:rPr>
-              <a:t>             ???</a:t>
-            </a:r>
-            <a:endParaRPr lang="en-US" dirty="0" smtClean="0">
-              <a:solidFill>
-                <a:schemeClr val="bg1"/>
-              </a:solidFill>
-            </a:endParaRPr>
+              <a:t> user                           Weight Watchers member                                      ???</a:t>
+            </a:r>
           </a:p>
         </p:txBody>
       </p:sp>
@@ -8440,93 +10611,123 @@
               </a:rPr>
               <a:t>Desired Outcome:</a:t>
             </a:r>
-            <a:endParaRPr lang="en-US" dirty="0" smtClean="0">
+          </a:p>
+          <a:p>
+            <a:pPr marL="285750" indent="-285750">
+              <a:buFont typeface="Arial" panose="020B0604020202020204" pitchFamily="34" charset="0"/>
+              <a:buChar char="•"/>
+            </a:pPr>
+            <a:r>
+              <a:rPr lang="en-US" dirty="0" smtClean="0">
+                <a:solidFill>
+                  <a:schemeClr val="bg1"/>
+                </a:solidFill>
+              </a:rPr>
+              <a:t>Challenging calorie tracking, WW points, &amp; motivational weight loss</a:t>
+            </a:r>
+          </a:p>
+          <a:p>
+            <a:pPr marL="285750" indent="-285750">
+              <a:buFont typeface="Arial" panose="020B0604020202020204" pitchFamily="34" charset="0"/>
+              <a:buChar char="•"/>
+            </a:pPr>
+            <a:r>
+              <a:rPr lang="en-US" dirty="0" smtClean="0">
+                <a:solidFill>
+                  <a:schemeClr val="bg1"/>
+                </a:solidFill>
+              </a:rPr>
+              <a:t>Available for iOS, Android, and Windows Phone 8</a:t>
+            </a:r>
+          </a:p>
+          <a:p>
+            <a:pPr marL="285750" indent="-285750">
+              <a:buFont typeface="Arial" panose="020B0604020202020204" pitchFamily="34" charset="0"/>
+              <a:buChar char="•"/>
+            </a:pPr>
+            <a:r>
+              <a:rPr lang="en-US" dirty="0" smtClean="0">
+                <a:solidFill>
+                  <a:schemeClr val="bg1"/>
+                </a:solidFill>
+              </a:rPr>
+              <a:t>Charge for the app</a:t>
+            </a:r>
+          </a:p>
+          <a:p>
+            <a:pPr marL="285750" indent="-285750">
+              <a:buFont typeface="Arial" panose="020B0604020202020204" pitchFamily="34" charset="0"/>
+              <a:buChar char="•"/>
+            </a:pPr>
+            <a:r>
+              <a:rPr lang="en-US" dirty="0" smtClean="0">
+                <a:solidFill>
+                  <a:schemeClr val="bg1"/>
+                </a:solidFill>
+              </a:rPr>
+              <a:t>Fast development cycles</a:t>
+            </a:r>
+          </a:p>
+        </p:txBody>
+      </p:sp>
+      <p:sp>
+        <p:nvSpPr>
+          <p:cNvPr id="2" name="TextBox 1"/>
+          <p:cNvSpPr txBox="1"/>
+          <p:nvPr/>
+        </p:nvSpPr>
+        <p:spPr>
+          <a:xfrm>
+            <a:off x="6573570" y="2006416"/>
+            <a:ext cx="2359025" cy="1015663"/>
+          </a:xfrm>
+          <a:prstGeom prst="rect">
+            <a:avLst/>
+          </a:prstGeom>
+          <a:noFill/>
+        </p:spPr>
+        <p:txBody>
+          <a:bodyPr wrap="square" rtlCol="0">
+            <a:spAutoFit/>
+          </a:bodyPr>
+          <a:lstStyle/>
+          <a:p>
+            <a:r>
+              <a:rPr lang="en-US" sz="4800" b="1" dirty="0" smtClean="0">
+                <a:solidFill>
+                  <a:schemeClr val="bg1"/>
+                </a:solidFill>
+              </a:rPr>
+              <a:t>PROFIT!</a:t>
+            </a:r>
+          </a:p>
+          <a:p>
+            <a:r>
+              <a:rPr lang="en-US" sz="1200" b="1" dirty="0" smtClean="0">
+                <a:solidFill>
+                  <a:schemeClr val="bg1"/>
+                </a:solidFill>
+              </a:rPr>
+              <a:t>                     (hopefully)</a:t>
+            </a:r>
+            <a:endParaRPr lang="en-US" sz="1200" b="1" dirty="0">
               <a:solidFill>
                 <a:schemeClr val="bg1"/>
               </a:solidFill>
             </a:endParaRPr>
           </a:p>
-          <a:p>
-            <a:pPr marL="285750" indent="-285750">
-              <a:buFont typeface="Arial" panose="020B0604020202020204" pitchFamily="34" charset="0"/>
-              <a:buChar char="•"/>
-            </a:pPr>
-            <a:r>
-              <a:rPr lang="en-US" dirty="0" smtClean="0">
-                <a:solidFill>
-                  <a:schemeClr val="bg1"/>
-                </a:solidFill>
-              </a:rPr>
-              <a:t>Challenging calorie tracking, WW points, &amp; motivational weight loss</a:t>
-            </a:r>
-          </a:p>
-          <a:p>
-            <a:pPr marL="285750" indent="-285750">
-              <a:buFont typeface="Arial" panose="020B0604020202020204" pitchFamily="34" charset="0"/>
-              <a:buChar char="•"/>
-            </a:pPr>
-            <a:r>
-              <a:rPr lang="en-US" dirty="0" smtClean="0">
-                <a:solidFill>
-                  <a:schemeClr val="bg1"/>
-                </a:solidFill>
-              </a:rPr>
-              <a:t>Available </a:t>
-            </a:r>
-            <a:r>
-              <a:rPr lang="en-US" dirty="0" smtClean="0">
-                <a:solidFill>
-                  <a:schemeClr val="bg1"/>
-                </a:solidFill>
-              </a:rPr>
-              <a:t>for iOS, Android, and Windows Phone 8</a:t>
-            </a:r>
-          </a:p>
-          <a:p>
-            <a:pPr marL="285750" indent="-285750">
-              <a:buFont typeface="Arial" panose="020B0604020202020204" pitchFamily="34" charset="0"/>
-              <a:buChar char="•"/>
-            </a:pPr>
-            <a:r>
-              <a:rPr lang="en-US" dirty="0" smtClean="0">
-                <a:solidFill>
-                  <a:schemeClr val="bg1"/>
-                </a:solidFill>
-              </a:rPr>
-              <a:t>Charge for the app</a:t>
-            </a:r>
-          </a:p>
-          <a:p>
-            <a:pPr marL="285750" indent="-285750">
-              <a:buFont typeface="Arial" panose="020B0604020202020204" pitchFamily="34" charset="0"/>
-              <a:buChar char="•"/>
-            </a:pPr>
-            <a:r>
-              <a:rPr lang="en-US" dirty="0" smtClean="0">
-                <a:solidFill>
-                  <a:schemeClr val="bg1"/>
-                </a:solidFill>
-              </a:rPr>
-              <a:t>Fast development cycles</a:t>
-            </a:r>
-            <a:endParaRPr lang="en-US" dirty="0" smtClean="0">
-              <a:solidFill>
-                <a:schemeClr val="bg1"/>
-              </a:solidFill>
-            </a:endParaRPr>
-          </a:p>
-        </p:txBody>
-      </p:sp>
-      <p:sp>
-        <p:nvSpPr>
-          <p:cNvPr id="2" name="TextBox 1"/>
+        </p:txBody>
+      </p:sp>
+      <p:sp>
+        <p:nvSpPr>
+          <p:cNvPr id="4" name="TextBox 3"/>
           <p:cNvSpPr txBox="1"/>
           <p:nvPr/>
         </p:nvSpPr>
         <p:spPr>
           <a:xfrm>
-            <a:off x="6573570" y="2006416"/>
-            <a:ext cx="2359025" cy="1015663"/>
+            <a:off x="3681145" y="914400"/>
+            <a:ext cx="2892425" cy="369332"/>
           </a:xfrm>
           <a:prstGeom prst="rect">
             <a:avLst/>
@@ -8540,24 +10741,14 @@
           <a:lstStyle/>
           <a:p>
             <a:r>
-              <a:rPr lang="en-US" sz="4800" b="1" dirty="0" smtClean="0">
+              <a:rPr lang="en-US" dirty="0" smtClean="0">
                 <a:solidFill>
                   <a:schemeClr val="bg1"/>
                 </a:solidFill>
               </a:rPr>
-              <a:t>PROFIT!</a:t>
-            </a:r>
-          </a:p>
-          <a:p>
-            <a:r>
-              <a:rPr lang="en-US" sz="1200" b="1" dirty="0" smtClean="0">
-                <a:solidFill>
-                  <a:schemeClr val="bg1"/>
-                </a:solidFill>
-              </a:rPr>
-              <a:t>                     (hopefully)</a:t>
-            </a:r>
-            <a:endParaRPr lang="en-US" sz="1200" b="1" dirty="0">
+              <a:t>An idea emerges…</a:t>
+            </a:r>
+            <a:endParaRPr lang="en-US" dirty="0">
               <a:solidFill>
                 <a:schemeClr val="bg1"/>
               </a:solidFill>
@@ -9322,13 +11513,8 @@
           <a:p>
             <a:r>
               <a:rPr lang="en-US" i="0" dirty="0" smtClean="0"/>
-              <a:t>Sublime Text </a:t>
-            </a:r>
-            <a:r>
-              <a:rPr lang="en-US" i="0" dirty="0" smtClean="0"/>
-              <a:t>3: </a:t>
-            </a:r>
-            <a:endParaRPr lang="en-US" i="0" dirty="0" smtClean="0"/>
+              <a:t>Sublime Text 3: </a:t>
+            </a:r>
           </a:p>
           <a:p>
             <a:pPr lvl="1"/>

</xml_diff>

<commit_message>
Showing Javier simple Git.
</commit_message>
<xml_diff>
--- a/That Conference 2014/Building PhoneGap Mobile App w KendoUI.pptx
+++ b/That Conference 2014/Building PhoneGap Mobile App w KendoUI.pptx
@@ -220,7 +220,7 @@
           <a:p>
             <a:fld id="{EC2BCC37-2920-4C1D-8057-51EE69B1718A}" type="datetimeFigureOut">
               <a:rPr lang="en-US" smtClean="0"/>
-              <a:t>7/13/2014</a:t>
+              <a:t>7/18/2014</a:t>
             </a:fld>
             <a:endParaRPr lang="en-US"/>
           </a:p>
@@ -1901,7 +1901,7 @@
           <a:p>
             <a:fld id="{34ED9B13-E5A7-4F15-9144-85834FFDF6F3}" type="datetimeFigureOut">
               <a:rPr lang="en-US" smtClean="0"/>
-              <a:t>7/13/2014</a:t>
+              <a:t>7/18/2014</a:t>
             </a:fld>
             <a:endParaRPr lang="en-US"/>
           </a:p>
@@ -2086,7 +2086,7 @@
           <a:p>
             <a:fld id="{34ED9B13-E5A7-4F15-9144-85834FFDF6F3}" type="datetimeFigureOut">
               <a:rPr lang="en-US" smtClean="0"/>
-              <a:t>7/13/2014</a:t>
+              <a:t>7/18/2014</a:t>
             </a:fld>
             <a:endParaRPr lang="en-US"/>
           </a:p>
@@ -2292,7 +2292,7 @@
           <a:p>
             <a:fld id="{34ED9B13-E5A7-4F15-9144-85834FFDF6F3}" type="datetimeFigureOut">
               <a:rPr lang="en-US" smtClean="0"/>
-              <a:t>7/13/2014</a:t>
+              <a:t>7/18/2014</a:t>
             </a:fld>
             <a:endParaRPr lang="en-US"/>
           </a:p>
@@ -2461,7 +2461,7 @@
           <a:p>
             <a:fld id="{34ED9B13-E5A7-4F15-9144-85834FFDF6F3}" type="datetimeFigureOut">
               <a:rPr lang="en-US" smtClean="0"/>
-              <a:t>7/13/2014</a:t>
+              <a:t>7/18/2014</a:t>
             </a:fld>
             <a:endParaRPr lang="en-US"/>
           </a:p>
@@ -2748,7 +2748,7 @@
           <a:p>
             <a:fld id="{34ED9B13-E5A7-4F15-9144-85834FFDF6F3}" type="datetimeFigureOut">
               <a:rPr lang="en-US" smtClean="0"/>
-              <a:t>7/13/2014</a:t>
+              <a:t>7/18/2014</a:t>
             </a:fld>
             <a:endParaRPr lang="en-US"/>
           </a:p>
@@ -3055,7 +3055,7 @@
           <a:p>
             <a:fld id="{34ED9B13-E5A7-4F15-9144-85834FFDF6F3}" type="datetimeFigureOut">
               <a:rPr lang="en-US" smtClean="0"/>
-              <a:t>7/13/2014</a:t>
+              <a:t>7/18/2014</a:t>
             </a:fld>
             <a:endParaRPr lang="en-US"/>
           </a:p>
@@ -3505,7 +3505,7 @@
           <a:p>
             <a:fld id="{34ED9B13-E5A7-4F15-9144-85834FFDF6F3}" type="datetimeFigureOut">
               <a:rPr lang="en-US" smtClean="0"/>
-              <a:t>7/13/2014</a:t>
+              <a:t>7/18/2014</a:t>
             </a:fld>
             <a:endParaRPr lang="en-US"/>
           </a:p>
@@ -3615,7 +3615,7 @@
           <a:p>
             <a:fld id="{34ED9B13-E5A7-4F15-9144-85834FFDF6F3}" type="datetimeFigureOut">
               <a:rPr lang="en-US" smtClean="0"/>
-              <a:t>7/13/2014</a:t>
+              <a:t>7/18/2014</a:t>
             </a:fld>
             <a:endParaRPr lang="en-US"/>
           </a:p>
@@ -3743,7 +3743,7 @@
           <a:p>
             <a:fld id="{34ED9B13-E5A7-4F15-9144-85834FFDF6F3}" type="datetimeFigureOut">
               <a:rPr lang="en-US" smtClean="0"/>
-              <a:t>7/13/2014</a:t>
+              <a:t>7/18/2014</a:t>
             </a:fld>
             <a:endParaRPr lang="en-US"/>
           </a:p>
@@ -4036,7 +4036,7 @@
           <a:p>
             <a:fld id="{34ED9B13-E5A7-4F15-9144-85834FFDF6F3}" type="datetimeFigureOut">
               <a:rPr lang="en-US" smtClean="0"/>
-              <a:t>7/13/2014</a:t>
+              <a:t>7/18/2014</a:t>
             </a:fld>
             <a:endParaRPr lang="en-US"/>
           </a:p>
@@ -4315,7 +4315,7 @@
           <a:p>
             <a:fld id="{34ED9B13-E5A7-4F15-9144-85834FFDF6F3}" type="datetimeFigureOut">
               <a:rPr lang="en-US" smtClean="0"/>
-              <a:t>7/13/2014</a:t>
+              <a:t>7/18/2014</a:t>
             </a:fld>
             <a:endParaRPr lang="en-US"/>
           </a:p>
@@ -5017,7 +5017,23 @@
                   <a:schemeClr val="bg1"/>
                 </a:solidFill>
               </a:rPr>
-              <a:t>The SAVO Group</a:t>
+              <a:t>The </a:t>
+            </a:r>
+            <a:r>
+              <a:rPr lang="en-US" sz="2800" smtClean="0">
+                <a:solidFill>
+                  <a:schemeClr val="bg1"/>
+                </a:solidFill>
+              </a:rPr>
+              <a:t>SAVO </a:t>
+            </a:r>
+            <a:r>
+              <a:rPr lang="en-US" sz="2800" smtClean="0">
+                <a:solidFill>
+                  <a:schemeClr val="bg1"/>
+                </a:solidFill>
+              </a:rPr>
+              <a:t>Group   </a:t>
             </a:r>
             <a:endParaRPr lang="en-US" sz="2800" dirty="0" smtClean="0">
               <a:solidFill>
@@ -6110,11 +6126,7 @@
             <a:pPr lvl="1"/>
             <a:r>
               <a:rPr lang="en-US" i="0" dirty="0" smtClean="0"/>
-              <a:t>Styling (</a:t>
-            </a:r>
-            <a:r>
-              <a:rPr lang="en-US" i="0" dirty="0" smtClean="0"/>
-              <a:t>CSS)</a:t>
+              <a:t>Styling (CSS)</a:t>
             </a:r>
             <a:endParaRPr lang="en-US" b="1" i="0" dirty="0" smtClean="0"/>
           </a:p>
@@ -6147,17 +6159,12 @@
               <a:rPr lang="en-US" i="0" dirty="0" smtClean="0"/>
               <a:t>app</a:t>
             </a:r>
-            <a:endParaRPr lang="en-US" i="0" dirty="0" smtClean="0"/>
           </a:p>
           <a:p>
             <a:pPr lvl="1"/>
             <a:r>
               <a:rPr lang="en-US" i="0" dirty="0" smtClean="0"/>
-              <a:t>Device </a:t>
-            </a:r>
-            <a:r>
-              <a:rPr lang="en-US" i="0" dirty="0" smtClean="0"/>
-              <a:t>APIs</a:t>
+              <a:t>Device APIs</a:t>
             </a:r>
             <a:endParaRPr lang="en-US" b="1" i="0" dirty="0" smtClean="0"/>
           </a:p>
@@ -7809,11 +7816,7 @@
           <a:p>
             <a:r>
               <a:rPr lang="en-US" dirty="0" smtClean="0"/>
-              <a:t>Kendo </a:t>
-            </a:r>
-            <a:r>
-              <a:rPr lang="en-US" dirty="0" smtClean="0"/>
-              <a:t>UI Framework</a:t>
+              <a:t>Kendo UI Framework</a:t>
             </a:r>
             <a:endParaRPr lang="en-US" dirty="0"/>
           </a:p>
@@ -9372,11 +9375,7 @@
             </a:r>
             <a:r>
               <a:rPr lang="en-US" sz="2500" baseline="0" dirty="0" smtClean="0"/>
-              <a:t> build: </a:t>
-            </a:r>
-            <a:r>
-              <a:rPr lang="en-US" sz="2500" baseline="0" dirty="0" smtClean="0"/>
-              <a:t>features</a:t>
+              <a:t> build: features</a:t>
             </a:r>
             <a:endParaRPr lang="en-US" sz="2500" dirty="0"/>
           </a:p>
@@ -9660,13 +9659,8 @@
             </a:r>
             <a:r>
               <a:rPr lang="en-US" b="1" i="0" dirty="0" smtClean="0"/>
-              <a:t>Kendo </a:t>
-            </a:r>
-            <a:r>
-              <a:rPr lang="en-US" b="1" i="0" dirty="0" smtClean="0"/>
-              <a:t>UI Mobile</a:t>
-            </a:r>
-            <a:endParaRPr lang="en-US" b="1" i="0" dirty="0" smtClean="0"/>
+              <a:t>Kendo UI Mobile</a:t>
+            </a:r>
           </a:p>
           <a:p>
             <a:pPr marL="0" indent="0">
@@ -9740,11 +9734,7 @@
           <a:p>
             <a:r>
               <a:rPr lang="en-US" dirty="0" smtClean="0"/>
-              <a:t>Creating a Hybrid app: </a:t>
-            </a:r>
-            <a:r>
-              <a:rPr lang="en-US" dirty="0" smtClean="0"/>
-              <a:t>recap</a:t>
+              <a:t>Creating a Hybrid app: recap</a:t>
             </a:r>
             <a:endParaRPr lang="en-US" dirty="0"/>
           </a:p>

</xml_diff>